<commit_message>
Spesific excel data extract/ Some new charts
</commit_message>
<xml_diff>
--- a/backend/uploads/output.pptx
+++ b/backend/uploads/output.pptx
@@ -6,6 +6,8 @@
   </p:sldMasterIdLst>
   <p:sldIdLst>
     <p:sldId id="256" r:id="rId7"/>
+    <p:sldId id="257" r:id="rId8"/>
+    <p:sldId id="258" r:id="rId9"/>
   </p:sldIdLst>
   <p:sldSz cx="9144000" cy="6858000" type="screen4x3"/>
   <p:notesSz cx="6858000" cy="9144000"/>
@@ -113,8 +115,2564 @@
   <c:chart>
     <c:autoTitleDeleted val="0"/>
     <c:plotArea>
+      <c:lineChart>
+        <c:grouping val="standard"/>
+        <c:varyColors val="0"/>
+        <c:ser>
+          <c:idx val="0"/>
+          <c:order val="0"/>
+          <c:tx>
+            <c:strRef>
+              <c:f>Sheet1!$B$1</c:f>
+              <c:strCache>
+                <c:ptCount val="1"/>
+                <c:pt idx="0">
+                  <c:v>Positive</c:v>
+                </c:pt>
+              </c:strCache>
+            </c:strRef>
+          </c:tx>
+          <c:spPr>
+            <a:ln w="31750"/>
+          </c:spPr>
+          <c:marker>
+            <c:symbol val="none"/>
+          </c:marker>
+          <c:cat>
+            <c:strRef>
+              <c:f>Sheet1!$A$2:$A$126</c:f>
+              <c:strCache>
+                <c:ptCount val="125"/>
+                <c:pt idx="0">
+                  <c:v>2025-04-02T06:45</c:v>
+                </c:pt>
+                <c:pt idx="1">
+                  <c:v>2025-04-02T07:45</c:v>
+                </c:pt>
+                <c:pt idx="2">
+                  <c:v>2025-04-02T13:53</c:v>
+                </c:pt>
+                <c:pt idx="3">
+                  <c:v>2025-04-05T06:41</c:v>
+                </c:pt>
+                <c:pt idx="4">
+                  <c:v>2025-04-05T07:50</c:v>
+                </c:pt>
+                <c:pt idx="5">
+                  <c:v>2025-04-07T08:55</c:v>
+                </c:pt>
+                <c:pt idx="6">
+                  <c:v>2025-04-08T11:31</c:v>
+                </c:pt>
+                <c:pt idx="7">
+                  <c:v>2025-04-08T15:25</c:v>
+                </c:pt>
+                <c:pt idx="8">
+                  <c:v>2025-04-08T15:28</c:v>
+                </c:pt>
+                <c:pt idx="9">
+                  <c:v>2025-04-09T12:00</c:v>
+                </c:pt>
+                <c:pt idx="10">
+                  <c:v>2025-04-10T12:06</c:v>
+                </c:pt>
+                <c:pt idx="11">
+                  <c:v>2025-04-10T13:50</c:v>
+                </c:pt>
+                <c:pt idx="12">
+                  <c:v>2025-04-11T04:51</c:v>
+                </c:pt>
+                <c:pt idx="13">
+                  <c:v>2025-04-11T05:04</c:v>
+                </c:pt>
+                <c:pt idx="14">
+                  <c:v>2025-04-11T10:23</c:v>
+                </c:pt>
+                <c:pt idx="15">
+                  <c:v>2025-04-11T12:52</c:v>
+                </c:pt>
+                <c:pt idx="16">
+                  <c:v>2025-04-11T12:57</c:v>
+                </c:pt>
+                <c:pt idx="17">
+                  <c:v>2025-04-11T13:03</c:v>
+                </c:pt>
+                <c:pt idx="18">
+                  <c:v>2025-04-11T13:18</c:v>
+                </c:pt>
+                <c:pt idx="19">
+                  <c:v>2025-04-11T13:26</c:v>
+                </c:pt>
+                <c:pt idx="20">
+                  <c:v>2025-04-11T13:43</c:v>
+                </c:pt>
+                <c:pt idx="21">
+                  <c:v>2025-04-11T14:15</c:v>
+                </c:pt>
+                <c:pt idx="22">
+                  <c:v>2025-04-12T09:39</c:v>
+                </c:pt>
+                <c:pt idx="23">
+                  <c:v>2025-04-12T10:14</c:v>
+                </c:pt>
+                <c:pt idx="24">
+                  <c:v>2025-04-14T07:51</c:v>
+                </c:pt>
+                <c:pt idx="25">
+                  <c:v>2025-04-15T06:29</c:v>
+                </c:pt>
+                <c:pt idx="26">
+                  <c:v>2025-04-15T07:37</c:v>
+                </c:pt>
+                <c:pt idx="27">
+                  <c:v>2025-04-15T07:45</c:v>
+                </c:pt>
+                <c:pt idx="28">
+                  <c:v>2025-04-15T09:21</c:v>
+                </c:pt>
+                <c:pt idx="29">
+                  <c:v>2025-04-15T09:31</c:v>
+                </c:pt>
+                <c:pt idx="30">
+                  <c:v>2025-04-15T11:39</c:v>
+                </c:pt>
+                <c:pt idx="31">
+                  <c:v>2025-04-15T11:52</c:v>
+                </c:pt>
+                <c:pt idx="32">
+                  <c:v>2025-04-15T12:03</c:v>
+                </c:pt>
+                <c:pt idx="33">
+                  <c:v>2025-04-15T12:06</c:v>
+                </c:pt>
+                <c:pt idx="34">
+                  <c:v>2025-04-16T10:02</c:v>
+                </c:pt>
+                <c:pt idx="35">
+                  <c:v>2025-04-16T10:45</c:v>
+                </c:pt>
+                <c:pt idx="36">
+                  <c:v>2025-04-17T07:18</c:v>
+                </c:pt>
+                <c:pt idx="37">
+                  <c:v>2025-04-17T14:16</c:v>
+                </c:pt>
+                <c:pt idx="38">
+                  <c:v>2025-04-18T06:51</c:v>
+                </c:pt>
+                <c:pt idx="39">
+                  <c:v>2025-04-18T07:08</c:v>
+                </c:pt>
+                <c:pt idx="40">
+                  <c:v>2025-04-18T10:15</c:v>
+                </c:pt>
+                <c:pt idx="41">
+                  <c:v>2025-04-20T11:26</c:v>
+                </c:pt>
+                <c:pt idx="42">
+                  <c:v>2025-04-20T16:40</c:v>
+                </c:pt>
+                <c:pt idx="43">
+                  <c:v>2025-04-20T19:23</c:v>
+                </c:pt>
+                <c:pt idx="44">
+                  <c:v>2025-04-20T19:27</c:v>
+                </c:pt>
+                <c:pt idx="45">
+                  <c:v>2025-04-21T07:08</c:v>
+                </c:pt>
+                <c:pt idx="46">
+                  <c:v>2025-04-21T07:40</c:v>
+                </c:pt>
+                <c:pt idx="47">
+                  <c:v>2025-04-21T08:09</c:v>
+                </c:pt>
+                <c:pt idx="48">
+                  <c:v>2025-04-21T10:06</c:v>
+                </c:pt>
+                <c:pt idx="49">
+                  <c:v>2025-04-21T11:34</c:v>
+                </c:pt>
+                <c:pt idx="50">
+                  <c:v>2025-04-21T13:18</c:v>
+                </c:pt>
+                <c:pt idx="51">
+                  <c:v>2025-04-21T13:40</c:v>
+                </c:pt>
+                <c:pt idx="52">
+                  <c:v>2025-04-21T13:44</c:v>
+                </c:pt>
+                <c:pt idx="53">
+                  <c:v>2025-04-21T13:57</c:v>
+                </c:pt>
+                <c:pt idx="54">
+                  <c:v>2025-04-21T14:04</c:v>
+                </c:pt>
+                <c:pt idx="55">
+                  <c:v>2025-04-21T14:30</c:v>
+                </c:pt>
+                <c:pt idx="56">
+                  <c:v>2025-04-21T14:43</c:v>
+                </c:pt>
+                <c:pt idx="57">
+                  <c:v>2025-04-22T05:41</c:v>
+                </c:pt>
+                <c:pt idx="58">
+                  <c:v>2025-04-22T08:21</c:v>
+                </c:pt>
+                <c:pt idx="59">
+                  <c:v>2025-04-22T11:47</c:v>
+                </c:pt>
+                <c:pt idx="60">
+                  <c:v>2025-04-22T12:10</c:v>
+                </c:pt>
+                <c:pt idx="61">
+                  <c:v>2025-04-23T09:48</c:v>
+                </c:pt>
+                <c:pt idx="62">
+                  <c:v>2025-04-23T10:17</c:v>
+                </c:pt>
+                <c:pt idx="63">
+                  <c:v>2025-04-23T10:51</c:v>
+                </c:pt>
+                <c:pt idx="64">
+                  <c:v>2025-04-23T11:42</c:v>
+                </c:pt>
+                <c:pt idx="65">
+                  <c:v>2025-04-23T11:44</c:v>
+                </c:pt>
+                <c:pt idx="66">
+                  <c:v>2025-04-23T12:04</c:v>
+                </c:pt>
+                <c:pt idx="67">
+                  <c:v>2025-04-23T12:09</c:v>
+                </c:pt>
+                <c:pt idx="68">
+                  <c:v>2025-04-23T12:23</c:v>
+                </c:pt>
+                <c:pt idx="69">
+                  <c:v>2025-04-23T12:24</c:v>
+                </c:pt>
+                <c:pt idx="70">
+                  <c:v>2025-04-23T12:30</c:v>
+                </c:pt>
+                <c:pt idx="71">
+                  <c:v>2025-04-23T12:32</c:v>
+                </c:pt>
+                <c:pt idx="72">
+                  <c:v>2025-04-23T12:47</c:v>
+                </c:pt>
+                <c:pt idx="73">
+                  <c:v>2025-04-23T12:48</c:v>
+                </c:pt>
+                <c:pt idx="74">
+                  <c:v>2025-04-23T12:50</c:v>
+                </c:pt>
+                <c:pt idx="75">
+                  <c:v>2025-04-23T12:57</c:v>
+                </c:pt>
+                <c:pt idx="76">
+                  <c:v>2025-04-23T13:12</c:v>
+                </c:pt>
+                <c:pt idx="77">
+                  <c:v>2025-04-23T13:15</c:v>
+                </c:pt>
+                <c:pt idx="78">
+                  <c:v>2025-04-23T15:03</c:v>
+                </c:pt>
+                <c:pt idx="79">
+                  <c:v>2025-04-23T16:49</c:v>
+                </c:pt>
+                <c:pt idx="80">
+                  <c:v>2025-04-23T18:55</c:v>
+                </c:pt>
+                <c:pt idx="81">
+                  <c:v>2025-04-23T20:08</c:v>
+                </c:pt>
+                <c:pt idx="82">
+                  <c:v>2025-04-24T03:30</c:v>
+                </c:pt>
+                <c:pt idx="83">
+                  <c:v>2025-04-24T04:39</c:v>
+                </c:pt>
+                <c:pt idx="84">
+                  <c:v>2025-04-24T04:41</c:v>
+                </c:pt>
+                <c:pt idx="85">
+                  <c:v>2025-04-24T06:13</c:v>
+                </c:pt>
+                <c:pt idx="86">
+                  <c:v>2025-04-24T06:23</c:v>
+                </c:pt>
+                <c:pt idx="87">
+                  <c:v>2025-04-24T06:33</c:v>
+                </c:pt>
+                <c:pt idx="88">
+                  <c:v>2025-04-24T06:51</c:v>
+                </c:pt>
+                <c:pt idx="89">
+                  <c:v>2025-04-24T07:14</c:v>
+                </c:pt>
+                <c:pt idx="90">
+                  <c:v>2025-04-24T07:21</c:v>
+                </c:pt>
+                <c:pt idx="91">
+                  <c:v>2025-04-24T08:06</c:v>
+                </c:pt>
+                <c:pt idx="92">
+                  <c:v>2025-04-24T08:31</c:v>
+                </c:pt>
+                <c:pt idx="93">
+                  <c:v>2025-04-24T08:33</c:v>
+                </c:pt>
+                <c:pt idx="94">
+                  <c:v>2025-04-24T08:45</c:v>
+                </c:pt>
+                <c:pt idx="95">
+                  <c:v>2025-04-24T09:00</c:v>
+                </c:pt>
+                <c:pt idx="96">
+                  <c:v>2025-04-24T09:02</c:v>
+                </c:pt>
+                <c:pt idx="97">
+                  <c:v>2025-04-24T09:06</c:v>
+                </c:pt>
+                <c:pt idx="98">
+                  <c:v>2025-04-24T09:11</c:v>
+                </c:pt>
+                <c:pt idx="99">
+                  <c:v>2025-04-24T09:26</c:v>
+                </c:pt>
+                <c:pt idx="100">
+                  <c:v>2025-04-24T09:39</c:v>
+                </c:pt>
+                <c:pt idx="101">
+                  <c:v>2025-04-24T11:02</c:v>
+                </c:pt>
+                <c:pt idx="102">
+                  <c:v>2025-04-24T11:05</c:v>
+                </c:pt>
+                <c:pt idx="103">
+                  <c:v>2025-04-24T11:07</c:v>
+                </c:pt>
+                <c:pt idx="104">
+                  <c:v>2025-04-24T11:09</c:v>
+                </c:pt>
+                <c:pt idx="105">
+                  <c:v>2025-04-24T12:19</c:v>
+                </c:pt>
+                <c:pt idx="106">
+                  <c:v>2025-04-24T12:34</c:v>
+                </c:pt>
+                <c:pt idx="107">
+                  <c:v>2025-04-24T13:36</c:v>
+                </c:pt>
+                <c:pt idx="108">
+                  <c:v>2025-04-24T13:47</c:v>
+                </c:pt>
+                <c:pt idx="109">
+                  <c:v>2025-04-24T14:15</c:v>
+                </c:pt>
+                <c:pt idx="110">
+                  <c:v>2025-04-24T15:31</c:v>
+                </c:pt>
+                <c:pt idx="111">
+                  <c:v>2025-04-24T15:45</c:v>
+                </c:pt>
+                <c:pt idx="112">
+                  <c:v>2025-04-24T16:03</c:v>
+                </c:pt>
+                <c:pt idx="113">
+                  <c:v>2025-04-24T21:24</c:v>
+                </c:pt>
+                <c:pt idx="114">
+                  <c:v>2025-04-25T05:09</c:v>
+                </c:pt>
+                <c:pt idx="115">
+                  <c:v>2025-04-25T05:16</c:v>
+                </c:pt>
+                <c:pt idx="116">
+                  <c:v>2025-04-25T06:24</c:v>
+                </c:pt>
+                <c:pt idx="117">
+                  <c:v>2025-04-25T07:57</c:v>
+                </c:pt>
+                <c:pt idx="118">
+                  <c:v>2025-04-25T13:52</c:v>
+                </c:pt>
+                <c:pt idx="119">
+                  <c:v>2025-04-25T14:00</c:v>
+                </c:pt>
+                <c:pt idx="120">
+                  <c:v>2025-04-25T14:22</c:v>
+                </c:pt>
+                <c:pt idx="121">
+                  <c:v>2025-04-28T09:51</c:v>
+                </c:pt>
+                <c:pt idx="122">
+                  <c:v>2025-04-29T05:05</c:v>
+                </c:pt>
+                <c:pt idx="123">
+                  <c:v>2025-04-29T05:33</c:v>
+                </c:pt>
+                <c:pt idx="124">
+                  <c:v>2025-04-29T05:53</c:v>
+                </c:pt>
+              </c:strCache>
+            </c:strRef>
+          </c:cat>
+          <c:val>
+            <c:numRef>
+              <c:f>Sheet1!$B$2:$B$126</c:f>
+              <c:numCache>
+                <c:formatCode>General</c:formatCode>
+                <c:ptCount val="125"/>
+                <c:pt idx="0">
+                  <c:v>0</c:v>
+                </c:pt>
+                <c:pt idx="1">
+                  <c:v>0</c:v>
+                </c:pt>
+                <c:pt idx="2">
+                  <c:v>0</c:v>
+                </c:pt>
+                <c:pt idx="3">
+                  <c:v>0</c:v>
+                </c:pt>
+                <c:pt idx="4">
+                  <c:v>0</c:v>
+                </c:pt>
+                <c:pt idx="5">
+                  <c:v>0</c:v>
+                </c:pt>
+                <c:pt idx="6">
+                  <c:v>1</c:v>
+                </c:pt>
+                <c:pt idx="7">
+                  <c:v>0</c:v>
+                </c:pt>
+                <c:pt idx="8">
+                  <c:v>0</c:v>
+                </c:pt>
+                <c:pt idx="9">
+                  <c:v>1</c:v>
+                </c:pt>
+                <c:pt idx="10">
+                  <c:v>0</c:v>
+                </c:pt>
+                <c:pt idx="11">
+                  <c:v>1</c:v>
+                </c:pt>
+                <c:pt idx="12">
+                  <c:v>1</c:v>
+                </c:pt>
+                <c:pt idx="13">
+                  <c:v>1</c:v>
+                </c:pt>
+                <c:pt idx="14">
+                  <c:v>0</c:v>
+                </c:pt>
+                <c:pt idx="15">
+                  <c:v>1</c:v>
+                </c:pt>
+                <c:pt idx="16">
+                  <c:v>1</c:v>
+                </c:pt>
+                <c:pt idx="17">
+                  <c:v>1</c:v>
+                </c:pt>
+                <c:pt idx="18">
+                  <c:v>1</c:v>
+                </c:pt>
+                <c:pt idx="19">
+                  <c:v>1</c:v>
+                </c:pt>
+                <c:pt idx="20">
+                  <c:v>1</c:v>
+                </c:pt>
+                <c:pt idx="21">
+                  <c:v>1</c:v>
+                </c:pt>
+                <c:pt idx="22">
+                  <c:v>1</c:v>
+                </c:pt>
+                <c:pt idx="23">
+                  <c:v>0</c:v>
+                </c:pt>
+                <c:pt idx="24">
+                  <c:v>1</c:v>
+                </c:pt>
+                <c:pt idx="25">
+                  <c:v>1</c:v>
+                </c:pt>
+                <c:pt idx="26">
+                  <c:v>1</c:v>
+                </c:pt>
+                <c:pt idx="27">
+                  <c:v>0</c:v>
+                </c:pt>
+                <c:pt idx="28">
+                  <c:v>0</c:v>
+                </c:pt>
+                <c:pt idx="29">
+                  <c:v>0</c:v>
+                </c:pt>
+                <c:pt idx="30">
+                  <c:v>2</c:v>
+                </c:pt>
+                <c:pt idx="31">
+                  <c:v>1</c:v>
+                </c:pt>
+                <c:pt idx="32">
+                  <c:v>0</c:v>
+                </c:pt>
+                <c:pt idx="33">
+                  <c:v>1</c:v>
+                </c:pt>
+                <c:pt idx="34">
+                  <c:v>0</c:v>
+                </c:pt>
+                <c:pt idx="35">
+                  <c:v>1</c:v>
+                </c:pt>
+                <c:pt idx="36">
+                  <c:v>1</c:v>
+                </c:pt>
+                <c:pt idx="37">
+                  <c:v>1</c:v>
+                </c:pt>
+                <c:pt idx="38">
+                  <c:v>1</c:v>
+                </c:pt>
+                <c:pt idx="39">
+                  <c:v>0</c:v>
+                </c:pt>
+                <c:pt idx="40">
+                  <c:v>1</c:v>
+                </c:pt>
+                <c:pt idx="41">
+                  <c:v>0</c:v>
+                </c:pt>
+                <c:pt idx="42">
+                  <c:v>0</c:v>
+                </c:pt>
+                <c:pt idx="43">
+                  <c:v>0</c:v>
+                </c:pt>
+                <c:pt idx="44">
+                  <c:v>0</c:v>
+                </c:pt>
+                <c:pt idx="45">
+                  <c:v>0</c:v>
+                </c:pt>
+                <c:pt idx="46">
+                  <c:v>0</c:v>
+                </c:pt>
+                <c:pt idx="47">
+                  <c:v>0</c:v>
+                </c:pt>
+                <c:pt idx="48">
+                  <c:v>1</c:v>
+                </c:pt>
+                <c:pt idx="49">
+                  <c:v>1</c:v>
+                </c:pt>
+                <c:pt idx="50">
+                  <c:v>1</c:v>
+                </c:pt>
+                <c:pt idx="51">
+                  <c:v>1</c:v>
+                </c:pt>
+                <c:pt idx="52">
+                  <c:v>1</c:v>
+                </c:pt>
+                <c:pt idx="53">
+                  <c:v>1</c:v>
+                </c:pt>
+                <c:pt idx="54">
+                  <c:v>1</c:v>
+                </c:pt>
+                <c:pt idx="55">
+                  <c:v>1</c:v>
+                </c:pt>
+                <c:pt idx="56">
+                  <c:v>1</c:v>
+                </c:pt>
+                <c:pt idx="57">
+                  <c:v>1</c:v>
+                </c:pt>
+                <c:pt idx="58">
+                  <c:v>1</c:v>
+                </c:pt>
+                <c:pt idx="59">
+                  <c:v>1</c:v>
+                </c:pt>
+                <c:pt idx="60">
+                  <c:v>0</c:v>
+                </c:pt>
+                <c:pt idx="61">
+                  <c:v>0</c:v>
+                </c:pt>
+                <c:pt idx="62">
+                  <c:v>0</c:v>
+                </c:pt>
+                <c:pt idx="63">
+                  <c:v>0</c:v>
+                </c:pt>
+                <c:pt idx="64">
+                  <c:v>0</c:v>
+                </c:pt>
+                <c:pt idx="65">
+                  <c:v>0</c:v>
+                </c:pt>
+                <c:pt idx="66">
+                  <c:v>0</c:v>
+                </c:pt>
+                <c:pt idx="67">
+                  <c:v>0</c:v>
+                </c:pt>
+                <c:pt idx="68">
+                  <c:v>0</c:v>
+                </c:pt>
+                <c:pt idx="69">
+                  <c:v>0</c:v>
+                </c:pt>
+                <c:pt idx="70">
+                  <c:v>0</c:v>
+                </c:pt>
+                <c:pt idx="71">
+                  <c:v>0</c:v>
+                </c:pt>
+                <c:pt idx="72">
+                  <c:v>0</c:v>
+                </c:pt>
+                <c:pt idx="73">
+                  <c:v>0</c:v>
+                </c:pt>
+                <c:pt idx="74">
+                  <c:v>0</c:v>
+                </c:pt>
+                <c:pt idx="75">
+                  <c:v>0</c:v>
+                </c:pt>
+                <c:pt idx="76">
+                  <c:v>0</c:v>
+                </c:pt>
+                <c:pt idx="77">
+                  <c:v>0</c:v>
+                </c:pt>
+                <c:pt idx="78">
+                  <c:v>0</c:v>
+                </c:pt>
+                <c:pt idx="79">
+                  <c:v>0</c:v>
+                </c:pt>
+                <c:pt idx="80">
+                  <c:v>0</c:v>
+                </c:pt>
+                <c:pt idx="81">
+                  <c:v>0</c:v>
+                </c:pt>
+                <c:pt idx="82">
+                  <c:v>0</c:v>
+                </c:pt>
+                <c:pt idx="83">
+                  <c:v>0</c:v>
+                </c:pt>
+                <c:pt idx="84">
+                  <c:v>0</c:v>
+                </c:pt>
+                <c:pt idx="85">
+                  <c:v>0</c:v>
+                </c:pt>
+                <c:pt idx="86">
+                  <c:v>0</c:v>
+                </c:pt>
+                <c:pt idx="87">
+                  <c:v>0</c:v>
+                </c:pt>
+                <c:pt idx="88">
+                  <c:v>0</c:v>
+                </c:pt>
+                <c:pt idx="89">
+                  <c:v>0</c:v>
+                </c:pt>
+                <c:pt idx="90">
+                  <c:v>0</c:v>
+                </c:pt>
+                <c:pt idx="91">
+                  <c:v>0</c:v>
+                </c:pt>
+                <c:pt idx="92">
+                  <c:v>0</c:v>
+                </c:pt>
+                <c:pt idx="93">
+                  <c:v>0</c:v>
+                </c:pt>
+                <c:pt idx="94">
+                  <c:v>0</c:v>
+                </c:pt>
+                <c:pt idx="95">
+                  <c:v>0</c:v>
+                </c:pt>
+                <c:pt idx="96">
+                  <c:v>0</c:v>
+                </c:pt>
+                <c:pt idx="97">
+                  <c:v>0</c:v>
+                </c:pt>
+                <c:pt idx="98">
+                  <c:v>0</c:v>
+                </c:pt>
+                <c:pt idx="99">
+                  <c:v>0</c:v>
+                </c:pt>
+                <c:pt idx="100">
+                  <c:v>0</c:v>
+                </c:pt>
+                <c:pt idx="101">
+                  <c:v>0</c:v>
+                </c:pt>
+                <c:pt idx="102">
+                  <c:v>0</c:v>
+                </c:pt>
+                <c:pt idx="103">
+                  <c:v>0</c:v>
+                </c:pt>
+                <c:pt idx="104">
+                  <c:v>0</c:v>
+                </c:pt>
+                <c:pt idx="105">
+                  <c:v>0</c:v>
+                </c:pt>
+                <c:pt idx="106">
+                  <c:v>0</c:v>
+                </c:pt>
+                <c:pt idx="107">
+                  <c:v>0</c:v>
+                </c:pt>
+                <c:pt idx="108">
+                  <c:v>0</c:v>
+                </c:pt>
+                <c:pt idx="109">
+                  <c:v>0</c:v>
+                </c:pt>
+                <c:pt idx="110">
+                  <c:v>0</c:v>
+                </c:pt>
+                <c:pt idx="111">
+                  <c:v>0</c:v>
+                </c:pt>
+                <c:pt idx="112">
+                  <c:v>0</c:v>
+                </c:pt>
+                <c:pt idx="113">
+                  <c:v>0</c:v>
+                </c:pt>
+                <c:pt idx="114">
+                  <c:v>0</c:v>
+                </c:pt>
+                <c:pt idx="115">
+                  <c:v>0</c:v>
+                </c:pt>
+                <c:pt idx="116">
+                  <c:v>0</c:v>
+                </c:pt>
+                <c:pt idx="117">
+                  <c:v>0</c:v>
+                </c:pt>
+                <c:pt idx="118">
+                  <c:v>1</c:v>
+                </c:pt>
+                <c:pt idx="119">
+                  <c:v>1</c:v>
+                </c:pt>
+                <c:pt idx="120">
+                  <c:v>1</c:v>
+                </c:pt>
+                <c:pt idx="121">
+                  <c:v>0</c:v>
+                </c:pt>
+                <c:pt idx="122">
+                  <c:v>0</c:v>
+                </c:pt>
+                <c:pt idx="123">
+                  <c:v>0</c:v>
+                </c:pt>
+                <c:pt idx="124">
+                  <c:v>0</c:v>
+                </c:pt>
+              </c:numCache>
+            </c:numRef>
+          </c:val>
+          <c:smooth val="0"/>
+        </c:ser>
+        <c:ser>
+          <c:idx val="1"/>
+          <c:order val="1"/>
+          <c:tx>
+            <c:strRef>
+              <c:f>Sheet1!$C$1</c:f>
+              <c:strCache>
+                <c:ptCount val="1"/>
+                <c:pt idx="0">
+                  <c:v>Neutral</c:v>
+                </c:pt>
+              </c:strCache>
+            </c:strRef>
+          </c:tx>
+          <c:spPr>
+            <a:ln w="31750"/>
+          </c:spPr>
+          <c:marker>
+            <c:symbol val="none"/>
+          </c:marker>
+          <c:cat>
+            <c:strRef>
+              <c:f>Sheet1!$A$2:$A$126</c:f>
+              <c:strCache>
+                <c:ptCount val="125"/>
+                <c:pt idx="0">
+                  <c:v>2025-04-02T06:45</c:v>
+                </c:pt>
+                <c:pt idx="1">
+                  <c:v>2025-04-02T07:45</c:v>
+                </c:pt>
+                <c:pt idx="2">
+                  <c:v>2025-04-02T13:53</c:v>
+                </c:pt>
+                <c:pt idx="3">
+                  <c:v>2025-04-05T06:41</c:v>
+                </c:pt>
+                <c:pt idx="4">
+                  <c:v>2025-04-05T07:50</c:v>
+                </c:pt>
+                <c:pt idx="5">
+                  <c:v>2025-04-07T08:55</c:v>
+                </c:pt>
+                <c:pt idx="6">
+                  <c:v>2025-04-08T11:31</c:v>
+                </c:pt>
+                <c:pt idx="7">
+                  <c:v>2025-04-08T15:25</c:v>
+                </c:pt>
+                <c:pt idx="8">
+                  <c:v>2025-04-08T15:28</c:v>
+                </c:pt>
+                <c:pt idx="9">
+                  <c:v>2025-04-09T12:00</c:v>
+                </c:pt>
+                <c:pt idx="10">
+                  <c:v>2025-04-10T12:06</c:v>
+                </c:pt>
+                <c:pt idx="11">
+                  <c:v>2025-04-10T13:50</c:v>
+                </c:pt>
+                <c:pt idx="12">
+                  <c:v>2025-04-11T04:51</c:v>
+                </c:pt>
+                <c:pt idx="13">
+                  <c:v>2025-04-11T05:04</c:v>
+                </c:pt>
+                <c:pt idx="14">
+                  <c:v>2025-04-11T10:23</c:v>
+                </c:pt>
+                <c:pt idx="15">
+                  <c:v>2025-04-11T12:52</c:v>
+                </c:pt>
+                <c:pt idx="16">
+                  <c:v>2025-04-11T12:57</c:v>
+                </c:pt>
+                <c:pt idx="17">
+                  <c:v>2025-04-11T13:03</c:v>
+                </c:pt>
+                <c:pt idx="18">
+                  <c:v>2025-04-11T13:18</c:v>
+                </c:pt>
+                <c:pt idx="19">
+                  <c:v>2025-04-11T13:26</c:v>
+                </c:pt>
+                <c:pt idx="20">
+                  <c:v>2025-04-11T13:43</c:v>
+                </c:pt>
+                <c:pt idx="21">
+                  <c:v>2025-04-11T14:15</c:v>
+                </c:pt>
+                <c:pt idx="22">
+                  <c:v>2025-04-12T09:39</c:v>
+                </c:pt>
+                <c:pt idx="23">
+                  <c:v>2025-04-12T10:14</c:v>
+                </c:pt>
+                <c:pt idx="24">
+                  <c:v>2025-04-14T07:51</c:v>
+                </c:pt>
+                <c:pt idx="25">
+                  <c:v>2025-04-15T06:29</c:v>
+                </c:pt>
+                <c:pt idx="26">
+                  <c:v>2025-04-15T07:37</c:v>
+                </c:pt>
+                <c:pt idx="27">
+                  <c:v>2025-04-15T07:45</c:v>
+                </c:pt>
+                <c:pt idx="28">
+                  <c:v>2025-04-15T09:21</c:v>
+                </c:pt>
+                <c:pt idx="29">
+                  <c:v>2025-04-15T09:31</c:v>
+                </c:pt>
+                <c:pt idx="30">
+                  <c:v>2025-04-15T11:39</c:v>
+                </c:pt>
+                <c:pt idx="31">
+                  <c:v>2025-04-15T11:52</c:v>
+                </c:pt>
+                <c:pt idx="32">
+                  <c:v>2025-04-15T12:03</c:v>
+                </c:pt>
+                <c:pt idx="33">
+                  <c:v>2025-04-15T12:06</c:v>
+                </c:pt>
+                <c:pt idx="34">
+                  <c:v>2025-04-16T10:02</c:v>
+                </c:pt>
+                <c:pt idx="35">
+                  <c:v>2025-04-16T10:45</c:v>
+                </c:pt>
+                <c:pt idx="36">
+                  <c:v>2025-04-17T07:18</c:v>
+                </c:pt>
+                <c:pt idx="37">
+                  <c:v>2025-04-17T14:16</c:v>
+                </c:pt>
+                <c:pt idx="38">
+                  <c:v>2025-04-18T06:51</c:v>
+                </c:pt>
+                <c:pt idx="39">
+                  <c:v>2025-04-18T07:08</c:v>
+                </c:pt>
+                <c:pt idx="40">
+                  <c:v>2025-04-18T10:15</c:v>
+                </c:pt>
+                <c:pt idx="41">
+                  <c:v>2025-04-20T11:26</c:v>
+                </c:pt>
+                <c:pt idx="42">
+                  <c:v>2025-04-20T16:40</c:v>
+                </c:pt>
+                <c:pt idx="43">
+                  <c:v>2025-04-20T19:23</c:v>
+                </c:pt>
+                <c:pt idx="44">
+                  <c:v>2025-04-20T19:27</c:v>
+                </c:pt>
+                <c:pt idx="45">
+                  <c:v>2025-04-21T07:08</c:v>
+                </c:pt>
+                <c:pt idx="46">
+                  <c:v>2025-04-21T07:40</c:v>
+                </c:pt>
+                <c:pt idx="47">
+                  <c:v>2025-04-21T08:09</c:v>
+                </c:pt>
+                <c:pt idx="48">
+                  <c:v>2025-04-21T10:06</c:v>
+                </c:pt>
+                <c:pt idx="49">
+                  <c:v>2025-04-21T11:34</c:v>
+                </c:pt>
+                <c:pt idx="50">
+                  <c:v>2025-04-21T13:18</c:v>
+                </c:pt>
+                <c:pt idx="51">
+                  <c:v>2025-04-21T13:40</c:v>
+                </c:pt>
+                <c:pt idx="52">
+                  <c:v>2025-04-21T13:44</c:v>
+                </c:pt>
+                <c:pt idx="53">
+                  <c:v>2025-04-21T13:57</c:v>
+                </c:pt>
+                <c:pt idx="54">
+                  <c:v>2025-04-21T14:04</c:v>
+                </c:pt>
+                <c:pt idx="55">
+                  <c:v>2025-04-21T14:30</c:v>
+                </c:pt>
+                <c:pt idx="56">
+                  <c:v>2025-04-21T14:43</c:v>
+                </c:pt>
+                <c:pt idx="57">
+                  <c:v>2025-04-22T05:41</c:v>
+                </c:pt>
+                <c:pt idx="58">
+                  <c:v>2025-04-22T08:21</c:v>
+                </c:pt>
+                <c:pt idx="59">
+                  <c:v>2025-04-22T11:47</c:v>
+                </c:pt>
+                <c:pt idx="60">
+                  <c:v>2025-04-22T12:10</c:v>
+                </c:pt>
+                <c:pt idx="61">
+                  <c:v>2025-04-23T09:48</c:v>
+                </c:pt>
+                <c:pt idx="62">
+                  <c:v>2025-04-23T10:17</c:v>
+                </c:pt>
+                <c:pt idx="63">
+                  <c:v>2025-04-23T10:51</c:v>
+                </c:pt>
+                <c:pt idx="64">
+                  <c:v>2025-04-23T11:42</c:v>
+                </c:pt>
+                <c:pt idx="65">
+                  <c:v>2025-04-23T11:44</c:v>
+                </c:pt>
+                <c:pt idx="66">
+                  <c:v>2025-04-23T12:04</c:v>
+                </c:pt>
+                <c:pt idx="67">
+                  <c:v>2025-04-23T12:09</c:v>
+                </c:pt>
+                <c:pt idx="68">
+                  <c:v>2025-04-23T12:23</c:v>
+                </c:pt>
+                <c:pt idx="69">
+                  <c:v>2025-04-23T12:24</c:v>
+                </c:pt>
+                <c:pt idx="70">
+                  <c:v>2025-04-23T12:30</c:v>
+                </c:pt>
+                <c:pt idx="71">
+                  <c:v>2025-04-23T12:32</c:v>
+                </c:pt>
+                <c:pt idx="72">
+                  <c:v>2025-04-23T12:47</c:v>
+                </c:pt>
+                <c:pt idx="73">
+                  <c:v>2025-04-23T12:48</c:v>
+                </c:pt>
+                <c:pt idx="74">
+                  <c:v>2025-04-23T12:50</c:v>
+                </c:pt>
+                <c:pt idx="75">
+                  <c:v>2025-04-23T12:57</c:v>
+                </c:pt>
+                <c:pt idx="76">
+                  <c:v>2025-04-23T13:12</c:v>
+                </c:pt>
+                <c:pt idx="77">
+                  <c:v>2025-04-23T13:15</c:v>
+                </c:pt>
+                <c:pt idx="78">
+                  <c:v>2025-04-23T15:03</c:v>
+                </c:pt>
+                <c:pt idx="79">
+                  <c:v>2025-04-23T16:49</c:v>
+                </c:pt>
+                <c:pt idx="80">
+                  <c:v>2025-04-23T18:55</c:v>
+                </c:pt>
+                <c:pt idx="81">
+                  <c:v>2025-04-23T20:08</c:v>
+                </c:pt>
+                <c:pt idx="82">
+                  <c:v>2025-04-24T03:30</c:v>
+                </c:pt>
+                <c:pt idx="83">
+                  <c:v>2025-04-24T04:39</c:v>
+                </c:pt>
+                <c:pt idx="84">
+                  <c:v>2025-04-24T04:41</c:v>
+                </c:pt>
+                <c:pt idx="85">
+                  <c:v>2025-04-24T06:13</c:v>
+                </c:pt>
+                <c:pt idx="86">
+                  <c:v>2025-04-24T06:23</c:v>
+                </c:pt>
+                <c:pt idx="87">
+                  <c:v>2025-04-24T06:33</c:v>
+                </c:pt>
+                <c:pt idx="88">
+                  <c:v>2025-04-24T06:51</c:v>
+                </c:pt>
+                <c:pt idx="89">
+                  <c:v>2025-04-24T07:14</c:v>
+                </c:pt>
+                <c:pt idx="90">
+                  <c:v>2025-04-24T07:21</c:v>
+                </c:pt>
+                <c:pt idx="91">
+                  <c:v>2025-04-24T08:06</c:v>
+                </c:pt>
+                <c:pt idx="92">
+                  <c:v>2025-04-24T08:31</c:v>
+                </c:pt>
+                <c:pt idx="93">
+                  <c:v>2025-04-24T08:33</c:v>
+                </c:pt>
+                <c:pt idx="94">
+                  <c:v>2025-04-24T08:45</c:v>
+                </c:pt>
+                <c:pt idx="95">
+                  <c:v>2025-04-24T09:00</c:v>
+                </c:pt>
+                <c:pt idx="96">
+                  <c:v>2025-04-24T09:02</c:v>
+                </c:pt>
+                <c:pt idx="97">
+                  <c:v>2025-04-24T09:06</c:v>
+                </c:pt>
+                <c:pt idx="98">
+                  <c:v>2025-04-24T09:11</c:v>
+                </c:pt>
+                <c:pt idx="99">
+                  <c:v>2025-04-24T09:26</c:v>
+                </c:pt>
+                <c:pt idx="100">
+                  <c:v>2025-04-24T09:39</c:v>
+                </c:pt>
+                <c:pt idx="101">
+                  <c:v>2025-04-24T11:02</c:v>
+                </c:pt>
+                <c:pt idx="102">
+                  <c:v>2025-04-24T11:05</c:v>
+                </c:pt>
+                <c:pt idx="103">
+                  <c:v>2025-04-24T11:07</c:v>
+                </c:pt>
+                <c:pt idx="104">
+                  <c:v>2025-04-24T11:09</c:v>
+                </c:pt>
+                <c:pt idx="105">
+                  <c:v>2025-04-24T12:19</c:v>
+                </c:pt>
+                <c:pt idx="106">
+                  <c:v>2025-04-24T12:34</c:v>
+                </c:pt>
+                <c:pt idx="107">
+                  <c:v>2025-04-24T13:36</c:v>
+                </c:pt>
+                <c:pt idx="108">
+                  <c:v>2025-04-24T13:47</c:v>
+                </c:pt>
+                <c:pt idx="109">
+                  <c:v>2025-04-24T14:15</c:v>
+                </c:pt>
+                <c:pt idx="110">
+                  <c:v>2025-04-24T15:31</c:v>
+                </c:pt>
+                <c:pt idx="111">
+                  <c:v>2025-04-24T15:45</c:v>
+                </c:pt>
+                <c:pt idx="112">
+                  <c:v>2025-04-24T16:03</c:v>
+                </c:pt>
+                <c:pt idx="113">
+                  <c:v>2025-04-24T21:24</c:v>
+                </c:pt>
+                <c:pt idx="114">
+                  <c:v>2025-04-25T05:09</c:v>
+                </c:pt>
+                <c:pt idx="115">
+                  <c:v>2025-04-25T05:16</c:v>
+                </c:pt>
+                <c:pt idx="116">
+                  <c:v>2025-04-25T06:24</c:v>
+                </c:pt>
+                <c:pt idx="117">
+                  <c:v>2025-04-25T07:57</c:v>
+                </c:pt>
+                <c:pt idx="118">
+                  <c:v>2025-04-25T13:52</c:v>
+                </c:pt>
+                <c:pt idx="119">
+                  <c:v>2025-04-25T14:00</c:v>
+                </c:pt>
+                <c:pt idx="120">
+                  <c:v>2025-04-25T14:22</c:v>
+                </c:pt>
+                <c:pt idx="121">
+                  <c:v>2025-04-28T09:51</c:v>
+                </c:pt>
+                <c:pt idx="122">
+                  <c:v>2025-04-29T05:05</c:v>
+                </c:pt>
+                <c:pt idx="123">
+                  <c:v>2025-04-29T05:33</c:v>
+                </c:pt>
+                <c:pt idx="124">
+                  <c:v>2025-04-29T05:53</c:v>
+                </c:pt>
+              </c:strCache>
+            </c:strRef>
+          </c:cat>
+          <c:val>
+            <c:numRef>
+              <c:f>Sheet1!$C$2:$C$126</c:f>
+              <c:numCache>
+                <c:formatCode>General</c:formatCode>
+                <c:ptCount val="125"/>
+                <c:pt idx="0">
+                  <c:v>1</c:v>
+                </c:pt>
+                <c:pt idx="1">
+                  <c:v>1</c:v>
+                </c:pt>
+                <c:pt idx="2">
+                  <c:v>0</c:v>
+                </c:pt>
+                <c:pt idx="3">
+                  <c:v>1</c:v>
+                </c:pt>
+                <c:pt idx="4">
+                  <c:v>1</c:v>
+                </c:pt>
+                <c:pt idx="5">
+                  <c:v>1</c:v>
+                </c:pt>
+                <c:pt idx="6">
+                  <c:v>0</c:v>
+                </c:pt>
+                <c:pt idx="7">
+                  <c:v>1</c:v>
+                </c:pt>
+                <c:pt idx="8">
+                  <c:v>1</c:v>
+                </c:pt>
+                <c:pt idx="9">
+                  <c:v>0</c:v>
+                </c:pt>
+                <c:pt idx="10">
+                  <c:v>1</c:v>
+                </c:pt>
+                <c:pt idx="11">
+                  <c:v>0</c:v>
+                </c:pt>
+                <c:pt idx="12">
+                  <c:v>0</c:v>
+                </c:pt>
+                <c:pt idx="13">
+                  <c:v>0</c:v>
+                </c:pt>
+                <c:pt idx="14">
+                  <c:v>0</c:v>
+                </c:pt>
+                <c:pt idx="15">
+                  <c:v>0</c:v>
+                </c:pt>
+                <c:pt idx="16">
+                  <c:v>0</c:v>
+                </c:pt>
+                <c:pt idx="17">
+                  <c:v>0</c:v>
+                </c:pt>
+                <c:pt idx="18">
+                  <c:v>0</c:v>
+                </c:pt>
+                <c:pt idx="19">
+                  <c:v>0</c:v>
+                </c:pt>
+                <c:pt idx="20">
+                  <c:v>0</c:v>
+                </c:pt>
+                <c:pt idx="21">
+                  <c:v>0</c:v>
+                </c:pt>
+                <c:pt idx="22">
+                  <c:v>0</c:v>
+                </c:pt>
+                <c:pt idx="23">
+                  <c:v>1</c:v>
+                </c:pt>
+                <c:pt idx="24">
+                  <c:v>0</c:v>
+                </c:pt>
+                <c:pt idx="25">
+                  <c:v>1</c:v>
+                </c:pt>
+                <c:pt idx="26">
+                  <c:v>0</c:v>
+                </c:pt>
+                <c:pt idx="27">
+                  <c:v>0</c:v>
+                </c:pt>
+                <c:pt idx="28">
+                  <c:v>1</c:v>
+                </c:pt>
+                <c:pt idx="29">
+                  <c:v>0</c:v>
+                </c:pt>
+                <c:pt idx="30">
+                  <c:v>0</c:v>
+                </c:pt>
+                <c:pt idx="31">
+                  <c:v>0</c:v>
+                </c:pt>
+                <c:pt idx="32">
+                  <c:v>1</c:v>
+                </c:pt>
+                <c:pt idx="33">
+                  <c:v>1</c:v>
+                </c:pt>
+                <c:pt idx="34">
+                  <c:v>0</c:v>
+                </c:pt>
+                <c:pt idx="35">
+                  <c:v>0</c:v>
+                </c:pt>
+                <c:pt idx="36">
+                  <c:v>0</c:v>
+                </c:pt>
+                <c:pt idx="37">
+                  <c:v>0</c:v>
+                </c:pt>
+                <c:pt idx="38">
+                  <c:v>0</c:v>
+                </c:pt>
+                <c:pt idx="39">
+                  <c:v>0</c:v>
+                </c:pt>
+                <c:pt idx="40">
+                  <c:v>0</c:v>
+                </c:pt>
+                <c:pt idx="41">
+                  <c:v>0</c:v>
+                </c:pt>
+                <c:pt idx="42">
+                  <c:v>0</c:v>
+                </c:pt>
+                <c:pt idx="43">
+                  <c:v>0</c:v>
+                </c:pt>
+                <c:pt idx="44">
+                  <c:v>0</c:v>
+                </c:pt>
+                <c:pt idx="45">
+                  <c:v>1</c:v>
+                </c:pt>
+                <c:pt idx="46">
+                  <c:v>1</c:v>
+                </c:pt>
+                <c:pt idx="47">
+                  <c:v>0</c:v>
+                </c:pt>
+                <c:pt idx="48">
+                  <c:v>0</c:v>
+                </c:pt>
+                <c:pt idx="49">
+                  <c:v>0</c:v>
+                </c:pt>
+                <c:pt idx="50">
+                  <c:v>0</c:v>
+                </c:pt>
+                <c:pt idx="51">
+                  <c:v>0</c:v>
+                </c:pt>
+                <c:pt idx="52">
+                  <c:v>0</c:v>
+                </c:pt>
+                <c:pt idx="53">
+                  <c:v>0</c:v>
+                </c:pt>
+                <c:pt idx="54">
+                  <c:v>0</c:v>
+                </c:pt>
+                <c:pt idx="55">
+                  <c:v>0</c:v>
+                </c:pt>
+                <c:pt idx="56">
+                  <c:v>0</c:v>
+                </c:pt>
+                <c:pt idx="57">
+                  <c:v>0</c:v>
+                </c:pt>
+                <c:pt idx="58">
+                  <c:v>0</c:v>
+                </c:pt>
+                <c:pt idx="59">
+                  <c:v>0</c:v>
+                </c:pt>
+                <c:pt idx="60">
+                  <c:v>1</c:v>
+                </c:pt>
+                <c:pt idx="61">
+                  <c:v>0</c:v>
+                </c:pt>
+                <c:pt idx="62">
+                  <c:v>0</c:v>
+                </c:pt>
+                <c:pt idx="63">
+                  <c:v>0</c:v>
+                </c:pt>
+                <c:pt idx="64">
+                  <c:v>0</c:v>
+                </c:pt>
+                <c:pt idx="65">
+                  <c:v>0</c:v>
+                </c:pt>
+                <c:pt idx="66">
+                  <c:v>0</c:v>
+                </c:pt>
+                <c:pt idx="67">
+                  <c:v>0</c:v>
+                </c:pt>
+                <c:pt idx="68">
+                  <c:v>0</c:v>
+                </c:pt>
+                <c:pt idx="69">
+                  <c:v>0</c:v>
+                </c:pt>
+                <c:pt idx="70">
+                  <c:v>0</c:v>
+                </c:pt>
+                <c:pt idx="71">
+                  <c:v>0</c:v>
+                </c:pt>
+                <c:pt idx="72">
+                  <c:v>0</c:v>
+                </c:pt>
+                <c:pt idx="73">
+                  <c:v>0</c:v>
+                </c:pt>
+                <c:pt idx="74">
+                  <c:v>0</c:v>
+                </c:pt>
+                <c:pt idx="75">
+                  <c:v>0</c:v>
+                </c:pt>
+                <c:pt idx="76">
+                  <c:v>0</c:v>
+                </c:pt>
+                <c:pt idx="77">
+                  <c:v>0</c:v>
+                </c:pt>
+                <c:pt idx="78">
+                  <c:v>0</c:v>
+                </c:pt>
+                <c:pt idx="79">
+                  <c:v>1</c:v>
+                </c:pt>
+                <c:pt idx="80">
+                  <c:v>0</c:v>
+                </c:pt>
+                <c:pt idx="81">
+                  <c:v>0</c:v>
+                </c:pt>
+                <c:pt idx="82">
+                  <c:v>0</c:v>
+                </c:pt>
+                <c:pt idx="83">
+                  <c:v>0</c:v>
+                </c:pt>
+                <c:pt idx="84">
+                  <c:v>0</c:v>
+                </c:pt>
+                <c:pt idx="85">
+                  <c:v>1</c:v>
+                </c:pt>
+                <c:pt idx="86">
+                  <c:v>0</c:v>
+                </c:pt>
+                <c:pt idx="87">
+                  <c:v>0</c:v>
+                </c:pt>
+                <c:pt idx="88">
+                  <c:v>0</c:v>
+                </c:pt>
+                <c:pt idx="89">
+                  <c:v>0</c:v>
+                </c:pt>
+                <c:pt idx="90">
+                  <c:v>0</c:v>
+                </c:pt>
+                <c:pt idx="91">
+                  <c:v>0</c:v>
+                </c:pt>
+                <c:pt idx="92">
+                  <c:v>0</c:v>
+                </c:pt>
+                <c:pt idx="93">
+                  <c:v>0</c:v>
+                </c:pt>
+                <c:pt idx="94">
+                  <c:v>0</c:v>
+                </c:pt>
+                <c:pt idx="95">
+                  <c:v>0</c:v>
+                </c:pt>
+                <c:pt idx="96">
+                  <c:v>0</c:v>
+                </c:pt>
+                <c:pt idx="97">
+                  <c:v>0</c:v>
+                </c:pt>
+                <c:pt idx="98">
+                  <c:v>0</c:v>
+                </c:pt>
+                <c:pt idx="99">
+                  <c:v>0</c:v>
+                </c:pt>
+                <c:pt idx="100">
+                  <c:v>0</c:v>
+                </c:pt>
+                <c:pt idx="101">
+                  <c:v>0</c:v>
+                </c:pt>
+                <c:pt idx="102">
+                  <c:v>0</c:v>
+                </c:pt>
+                <c:pt idx="103">
+                  <c:v>0</c:v>
+                </c:pt>
+                <c:pt idx="104">
+                  <c:v>0</c:v>
+                </c:pt>
+                <c:pt idx="105">
+                  <c:v>0</c:v>
+                </c:pt>
+                <c:pt idx="106">
+                  <c:v>0</c:v>
+                </c:pt>
+                <c:pt idx="107">
+                  <c:v>0</c:v>
+                </c:pt>
+                <c:pt idx="108">
+                  <c:v>0</c:v>
+                </c:pt>
+                <c:pt idx="109">
+                  <c:v>0</c:v>
+                </c:pt>
+                <c:pt idx="110">
+                  <c:v>0</c:v>
+                </c:pt>
+                <c:pt idx="111">
+                  <c:v>0</c:v>
+                </c:pt>
+                <c:pt idx="112">
+                  <c:v>0</c:v>
+                </c:pt>
+                <c:pt idx="113">
+                  <c:v>0</c:v>
+                </c:pt>
+                <c:pt idx="114">
+                  <c:v>0</c:v>
+                </c:pt>
+                <c:pt idx="115">
+                  <c:v>0</c:v>
+                </c:pt>
+                <c:pt idx="116">
+                  <c:v>0</c:v>
+                </c:pt>
+                <c:pt idx="117">
+                  <c:v>0</c:v>
+                </c:pt>
+                <c:pt idx="118">
+                  <c:v>0</c:v>
+                </c:pt>
+                <c:pt idx="119">
+                  <c:v>0</c:v>
+                </c:pt>
+                <c:pt idx="120">
+                  <c:v>0</c:v>
+                </c:pt>
+                <c:pt idx="121">
+                  <c:v>0</c:v>
+                </c:pt>
+                <c:pt idx="122">
+                  <c:v>1</c:v>
+                </c:pt>
+                <c:pt idx="123">
+                  <c:v>1</c:v>
+                </c:pt>
+                <c:pt idx="124">
+                  <c:v>1</c:v>
+                </c:pt>
+              </c:numCache>
+            </c:numRef>
+          </c:val>
+          <c:smooth val="0"/>
+        </c:ser>
+        <c:ser>
+          <c:idx val="2"/>
+          <c:order val="2"/>
+          <c:tx>
+            <c:strRef>
+              <c:f>Sheet1!$D$1</c:f>
+              <c:strCache>
+                <c:ptCount val="1"/>
+                <c:pt idx="0">
+                  <c:v>Negative</c:v>
+                </c:pt>
+              </c:strCache>
+            </c:strRef>
+          </c:tx>
+          <c:spPr>
+            <a:ln w="31750"/>
+          </c:spPr>
+          <c:marker>
+            <c:symbol val="none"/>
+          </c:marker>
+          <c:cat>
+            <c:strRef>
+              <c:f>Sheet1!$A$2:$A$126</c:f>
+              <c:strCache>
+                <c:ptCount val="125"/>
+                <c:pt idx="0">
+                  <c:v>2025-04-02T06:45</c:v>
+                </c:pt>
+                <c:pt idx="1">
+                  <c:v>2025-04-02T07:45</c:v>
+                </c:pt>
+                <c:pt idx="2">
+                  <c:v>2025-04-02T13:53</c:v>
+                </c:pt>
+                <c:pt idx="3">
+                  <c:v>2025-04-05T06:41</c:v>
+                </c:pt>
+                <c:pt idx="4">
+                  <c:v>2025-04-05T07:50</c:v>
+                </c:pt>
+                <c:pt idx="5">
+                  <c:v>2025-04-07T08:55</c:v>
+                </c:pt>
+                <c:pt idx="6">
+                  <c:v>2025-04-08T11:31</c:v>
+                </c:pt>
+                <c:pt idx="7">
+                  <c:v>2025-04-08T15:25</c:v>
+                </c:pt>
+                <c:pt idx="8">
+                  <c:v>2025-04-08T15:28</c:v>
+                </c:pt>
+                <c:pt idx="9">
+                  <c:v>2025-04-09T12:00</c:v>
+                </c:pt>
+                <c:pt idx="10">
+                  <c:v>2025-04-10T12:06</c:v>
+                </c:pt>
+                <c:pt idx="11">
+                  <c:v>2025-04-10T13:50</c:v>
+                </c:pt>
+                <c:pt idx="12">
+                  <c:v>2025-04-11T04:51</c:v>
+                </c:pt>
+                <c:pt idx="13">
+                  <c:v>2025-04-11T05:04</c:v>
+                </c:pt>
+                <c:pt idx="14">
+                  <c:v>2025-04-11T10:23</c:v>
+                </c:pt>
+                <c:pt idx="15">
+                  <c:v>2025-04-11T12:52</c:v>
+                </c:pt>
+                <c:pt idx="16">
+                  <c:v>2025-04-11T12:57</c:v>
+                </c:pt>
+                <c:pt idx="17">
+                  <c:v>2025-04-11T13:03</c:v>
+                </c:pt>
+                <c:pt idx="18">
+                  <c:v>2025-04-11T13:18</c:v>
+                </c:pt>
+                <c:pt idx="19">
+                  <c:v>2025-04-11T13:26</c:v>
+                </c:pt>
+                <c:pt idx="20">
+                  <c:v>2025-04-11T13:43</c:v>
+                </c:pt>
+                <c:pt idx="21">
+                  <c:v>2025-04-11T14:15</c:v>
+                </c:pt>
+                <c:pt idx="22">
+                  <c:v>2025-04-12T09:39</c:v>
+                </c:pt>
+                <c:pt idx="23">
+                  <c:v>2025-04-12T10:14</c:v>
+                </c:pt>
+                <c:pt idx="24">
+                  <c:v>2025-04-14T07:51</c:v>
+                </c:pt>
+                <c:pt idx="25">
+                  <c:v>2025-04-15T06:29</c:v>
+                </c:pt>
+                <c:pt idx="26">
+                  <c:v>2025-04-15T07:37</c:v>
+                </c:pt>
+                <c:pt idx="27">
+                  <c:v>2025-04-15T07:45</c:v>
+                </c:pt>
+                <c:pt idx="28">
+                  <c:v>2025-04-15T09:21</c:v>
+                </c:pt>
+                <c:pt idx="29">
+                  <c:v>2025-04-15T09:31</c:v>
+                </c:pt>
+                <c:pt idx="30">
+                  <c:v>2025-04-15T11:39</c:v>
+                </c:pt>
+                <c:pt idx="31">
+                  <c:v>2025-04-15T11:52</c:v>
+                </c:pt>
+                <c:pt idx="32">
+                  <c:v>2025-04-15T12:03</c:v>
+                </c:pt>
+                <c:pt idx="33">
+                  <c:v>2025-04-15T12:06</c:v>
+                </c:pt>
+                <c:pt idx="34">
+                  <c:v>2025-04-16T10:02</c:v>
+                </c:pt>
+                <c:pt idx="35">
+                  <c:v>2025-04-16T10:45</c:v>
+                </c:pt>
+                <c:pt idx="36">
+                  <c:v>2025-04-17T07:18</c:v>
+                </c:pt>
+                <c:pt idx="37">
+                  <c:v>2025-04-17T14:16</c:v>
+                </c:pt>
+                <c:pt idx="38">
+                  <c:v>2025-04-18T06:51</c:v>
+                </c:pt>
+                <c:pt idx="39">
+                  <c:v>2025-04-18T07:08</c:v>
+                </c:pt>
+                <c:pt idx="40">
+                  <c:v>2025-04-18T10:15</c:v>
+                </c:pt>
+                <c:pt idx="41">
+                  <c:v>2025-04-20T11:26</c:v>
+                </c:pt>
+                <c:pt idx="42">
+                  <c:v>2025-04-20T16:40</c:v>
+                </c:pt>
+                <c:pt idx="43">
+                  <c:v>2025-04-20T19:23</c:v>
+                </c:pt>
+                <c:pt idx="44">
+                  <c:v>2025-04-20T19:27</c:v>
+                </c:pt>
+                <c:pt idx="45">
+                  <c:v>2025-04-21T07:08</c:v>
+                </c:pt>
+                <c:pt idx="46">
+                  <c:v>2025-04-21T07:40</c:v>
+                </c:pt>
+                <c:pt idx="47">
+                  <c:v>2025-04-21T08:09</c:v>
+                </c:pt>
+                <c:pt idx="48">
+                  <c:v>2025-04-21T10:06</c:v>
+                </c:pt>
+                <c:pt idx="49">
+                  <c:v>2025-04-21T11:34</c:v>
+                </c:pt>
+                <c:pt idx="50">
+                  <c:v>2025-04-21T13:18</c:v>
+                </c:pt>
+                <c:pt idx="51">
+                  <c:v>2025-04-21T13:40</c:v>
+                </c:pt>
+                <c:pt idx="52">
+                  <c:v>2025-04-21T13:44</c:v>
+                </c:pt>
+                <c:pt idx="53">
+                  <c:v>2025-04-21T13:57</c:v>
+                </c:pt>
+                <c:pt idx="54">
+                  <c:v>2025-04-21T14:04</c:v>
+                </c:pt>
+                <c:pt idx="55">
+                  <c:v>2025-04-21T14:30</c:v>
+                </c:pt>
+                <c:pt idx="56">
+                  <c:v>2025-04-21T14:43</c:v>
+                </c:pt>
+                <c:pt idx="57">
+                  <c:v>2025-04-22T05:41</c:v>
+                </c:pt>
+                <c:pt idx="58">
+                  <c:v>2025-04-22T08:21</c:v>
+                </c:pt>
+                <c:pt idx="59">
+                  <c:v>2025-04-22T11:47</c:v>
+                </c:pt>
+                <c:pt idx="60">
+                  <c:v>2025-04-22T12:10</c:v>
+                </c:pt>
+                <c:pt idx="61">
+                  <c:v>2025-04-23T09:48</c:v>
+                </c:pt>
+                <c:pt idx="62">
+                  <c:v>2025-04-23T10:17</c:v>
+                </c:pt>
+                <c:pt idx="63">
+                  <c:v>2025-04-23T10:51</c:v>
+                </c:pt>
+                <c:pt idx="64">
+                  <c:v>2025-04-23T11:42</c:v>
+                </c:pt>
+                <c:pt idx="65">
+                  <c:v>2025-04-23T11:44</c:v>
+                </c:pt>
+                <c:pt idx="66">
+                  <c:v>2025-04-23T12:04</c:v>
+                </c:pt>
+                <c:pt idx="67">
+                  <c:v>2025-04-23T12:09</c:v>
+                </c:pt>
+                <c:pt idx="68">
+                  <c:v>2025-04-23T12:23</c:v>
+                </c:pt>
+                <c:pt idx="69">
+                  <c:v>2025-04-23T12:24</c:v>
+                </c:pt>
+                <c:pt idx="70">
+                  <c:v>2025-04-23T12:30</c:v>
+                </c:pt>
+                <c:pt idx="71">
+                  <c:v>2025-04-23T12:32</c:v>
+                </c:pt>
+                <c:pt idx="72">
+                  <c:v>2025-04-23T12:47</c:v>
+                </c:pt>
+                <c:pt idx="73">
+                  <c:v>2025-04-23T12:48</c:v>
+                </c:pt>
+                <c:pt idx="74">
+                  <c:v>2025-04-23T12:50</c:v>
+                </c:pt>
+                <c:pt idx="75">
+                  <c:v>2025-04-23T12:57</c:v>
+                </c:pt>
+                <c:pt idx="76">
+                  <c:v>2025-04-23T13:12</c:v>
+                </c:pt>
+                <c:pt idx="77">
+                  <c:v>2025-04-23T13:15</c:v>
+                </c:pt>
+                <c:pt idx="78">
+                  <c:v>2025-04-23T15:03</c:v>
+                </c:pt>
+                <c:pt idx="79">
+                  <c:v>2025-04-23T16:49</c:v>
+                </c:pt>
+                <c:pt idx="80">
+                  <c:v>2025-04-23T18:55</c:v>
+                </c:pt>
+                <c:pt idx="81">
+                  <c:v>2025-04-23T20:08</c:v>
+                </c:pt>
+                <c:pt idx="82">
+                  <c:v>2025-04-24T03:30</c:v>
+                </c:pt>
+                <c:pt idx="83">
+                  <c:v>2025-04-24T04:39</c:v>
+                </c:pt>
+                <c:pt idx="84">
+                  <c:v>2025-04-24T04:41</c:v>
+                </c:pt>
+                <c:pt idx="85">
+                  <c:v>2025-04-24T06:13</c:v>
+                </c:pt>
+                <c:pt idx="86">
+                  <c:v>2025-04-24T06:23</c:v>
+                </c:pt>
+                <c:pt idx="87">
+                  <c:v>2025-04-24T06:33</c:v>
+                </c:pt>
+                <c:pt idx="88">
+                  <c:v>2025-04-24T06:51</c:v>
+                </c:pt>
+                <c:pt idx="89">
+                  <c:v>2025-04-24T07:14</c:v>
+                </c:pt>
+                <c:pt idx="90">
+                  <c:v>2025-04-24T07:21</c:v>
+                </c:pt>
+                <c:pt idx="91">
+                  <c:v>2025-04-24T08:06</c:v>
+                </c:pt>
+                <c:pt idx="92">
+                  <c:v>2025-04-24T08:31</c:v>
+                </c:pt>
+                <c:pt idx="93">
+                  <c:v>2025-04-24T08:33</c:v>
+                </c:pt>
+                <c:pt idx="94">
+                  <c:v>2025-04-24T08:45</c:v>
+                </c:pt>
+                <c:pt idx="95">
+                  <c:v>2025-04-24T09:00</c:v>
+                </c:pt>
+                <c:pt idx="96">
+                  <c:v>2025-04-24T09:02</c:v>
+                </c:pt>
+                <c:pt idx="97">
+                  <c:v>2025-04-24T09:06</c:v>
+                </c:pt>
+                <c:pt idx="98">
+                  <c:v>2025-04-24T09:11</c:v>
+                </c:pt>
+                <c:pt idx="99">
+                  <c:v>2025-04-24T09:26</c:v>
+                </c:pt>
+                <c:pt idx="100">
+                  <c:v>2025-04-24T09:39</c:v>
+                </c:pt>
+                <c:pt idx="101">
+                  <c:v>2025-04-24T11:02</c:v>
+                </c:pt>
+                <c:pt idx="102">
+                  <c:v>2025-04-24T11:05</c:v>
+                </c:pt>
+                <c:pt idx="103">
+                  <c:v>2025-04-24T11:07</c:v>
+                </c:pt>
+                <c:pt idx="104">
+                  <c:v>2025-04-24T11:09</c:v>
+                </c:pt>
+                <c:pt idx="105">
+                  <c:v>2025-04-24T12:19</c:v>
+                </c:pt>
+                <c:pt idx="106">
+                  <c:v>2025-04-24T12:34</c:v>
+                </c:pt>
+                <c:pt idx="107">
+                  <c:v>2025-04-24T13:36</c:v>
+                </c:pt>
+                <c:pt idx="108">
+                  <c:v>2025-04-24T13:47</c:v>
+                </c:pt>
+                <c:pt idx="109">
+                  <c:v>2025-04-24T14:15</c:v>
+                </c:pt>
+                <c:pt idx="110">
+                  <c:v>2025-04-24T15:31</c:v>
+                </c:pt>
+                <c:pt idx="111">
+                  <c:v>2025-04-24T15:45</c:v>
+                </c:pt>
+                <c:pt idx="112">
+                  <c:v>2025-04-24T16:03</c:v>
+                </c:pt>
+                <c:pt idx="113">
+                  <c:v>2025-04-24T21:24</c:v>
+                </c:pt>
+                <c:pt idx="114">
+                  <c:v>2025-04-25T05:09</c:v>
+                </c:pt>
+                <c:pt idx="115">
+                  <c:v>2025-04-25T05:16</c:v>
+                </c:pt>
+                <c:pt idx="116">
+                  <c:v>2025-04-25T06:24</c:v>
+                </c:pt>
+                <c:pt idx="117">
+                  <c:v>2025-04-25T07:57</c:v>
+                </c:pt>
+                <c:pt idx="118">
+                  <c:v>2025-04-25T13:52</c:v>
+                </c:pt>
+                <c:pt idx="119">
+                  <c:v>2025-04-25T14:00</c:v>
+                </c:pt>
+                <c:pt idx="120">
+                  <c:v>2025-04-25T14:22</c:v>
+                </c:pt>
+                <c:pt idx="121">
+                  <c:v>2025-04-28T09:51</c:v>
+                </c:pt>
+                <c:pt idx="122">
+                  <c:v>2025-04-29T05:05</c:v>
+                </c:pt>
+                <c:pt idx="123">
+                  <c:v>2025-04-29T05:33</c:v>
+                </c:pt>
+                <c:pt idx="124">
+                  <c:v>2025-04-29T05:53</c:v>
+                </c:pt>
+              </c:strCache>
+            </c:strRef>
+          </c:cat>
+          <c:val>
+            <c:numRef>
+              <c:f>Sheet1!$D$2:$D$126</c:f>
+              <c:numCache>
+                <c:formatCode>General</c:formatCode>
+                <c:ptCount val="125"/>
+                <c:pt idx="0">
+                  <c:v>0</c:v>
+                </c:pt>
+                <c:pt idx="1">
+                  <c:v>0</c:v>
+                </c:pt>
+                <c:pt idx="2">
+                  <c:v>1</c:v>
+                </c:pt>
+                <c:pt idx="3">
+                  <c:v>0</c:v>
+                </c:pt>
+                <c:pt idx="4">
+                  <c:v>0</c:v>
+                </c:pt>
+                <c:pt idx="5">
+                  <c:v>0</c:v>
+                </c:pt>
+                <c:pt idx="6">
+                  <c:v>0</c:v>
+                </c:pt>
+                <c:pt idx="7">
+                  <c:v>0</c:v>
+                </c:pt>
+                <c:pt idx="8">
+                  <c:v>0</c:v>
+                </c:pt>
+                <c:pt idx="9">
+                  <c:v>0</c:v>
+                </c:pt>
+                <c:pt idx="10">
+                  <c:v>0</c:v>
+                </c:pt>
+                <c:pt idx="11">
+                  <c:v>0</c:v>
+                </c:pt>
+                <c:pt idx="12">
+                  <c:v>0</c:v>
+                </c:pt>
+                <c:pt idx="13">
+                  <c:v>0</c:v>
+                </c:pt>
+                <c:pt idx="14">
+                  <c:v>1</c:v>
+                </c:pt>
+                <c:pt idx="15">
+                  <c:v>0</c:v>
+                </c:pt>
+                <c:pt idx="16">
+                  <c:v>0</c:v>
+                </c:pt>
+                <c:pt idx="17">
+                  <c:v>0</c:v>
+                </c:pt>
+                <c:pt idx="18">
+                  <c:v>0</c:v>
+                </c:pt>
+                <c:pt idx="19">
+                  <c:v>0</c:v>
+                </c:pt>
+                <c:pt idx="20">
+                  <c:v>0</c:v>
+                </c:pt>
+                <c:pt idx="21">
+                  <c:v>0</c:v>
+                </c:pt>
+                <c:pt idx="22">
+                  <c:v>0</c:v>
+                </c:pt>
+                <c:pt idx="23">
+                  <c:v>0</c:v>
+                </c:pt>
+                <c:pt idx="24">
+                  <c:v>0</c:v>
+                </c:pt>
+                <c:pt idx="25">
+                  <c:v>0</c:v>
+                </c:pt>
+                <c:pt idx="26">
+                  <c:v>0</c:v>
+                </c:pt>
+                <c:pt idx="27">
+                  <c:v>1</c:v>
+                </c:pt>
+                <c:pt idx="28">
+                  <c:v>0</c:v>
+                </c:pt>
+                <c:pt idx="29">
+                  <c:v>1</c:v>
+                </c:pt>
+                <c:pt idx="30">
+                  <c:v>0</c:v>
+                </c:pt>
+                <c:pt idx="31">
+                  <c:v>0</c:v>
+                </c:pt>
+                <c:pt idx="32">
+                  <c:v>0</c:v>
+                </c:pt>
+                <c:pt idx="33">
+                  <c:v>0</c:v>
+                </c:pt>
+                <c:pt idx="34">
+                  <c:v>1</c:v>
+                </c:pt>
+                <c:pt idx="35">
+                  <c:v>0</c:v>
+                </c:pt>
+                <c:pt idx="36">
+                  <c:v>0</c:v>
+                </c:pt>
+                <c:pt idx="37">
+                  <c:v>0</c:v>
+                </c:pt>
+                <c:pt idx="38">
+                  <c:v>0</c:v>
+                </c:pt>
+                <c:pt idx="39">
+                  <c:v>1</c:v>
+                </c:pt>
+                <c:pt idx="40">
+                  <c:v>0</c:v>
+                </c:pt>
+                <c:pt idx="41">
+                  <c:v>2</c:v>
+                </c:pt>
+                <c:pt idx="42">
+                  <c:v>1</c:v>
+                </c:pt>
+                <c:pt idx="43">
+                  <c:v>1</c:v>
+                </c:pt>
+                <c:pt idx="44">
+                  <c:v>1</c:v>
+                </c:pt>
+                <c:pt idx="45">
+                  <c:v>0</c:v>
+                </c:pt>
+                <c:pt idx="46">
+                  <c:v>0</c:v>
+                </c:pt>
+                <c:pt idx="47">
+                  <c:v>1</c:v>
+                </c:pt>
+                <c:pt idx="48">
+                  <c:v>0</c:v>
+                </c:pt>
+                <c:pt idx="49">
+                  <c:v>0</c:v>
+                </c:pt>
+                <c:pt idx="50">
+                  <c:v>0</c:v>
+                </c:pt>
+                <c:pt idx="51">
+                  <c:v>0</c:v>
+                </c:pt>
+                <c:pt idx="52">
+                  <c:v>0</c:v>
+                </c:pt>
+                <c:pt idx="53">
+                  <c:v>0</c:v>
+                </c:pt>
+                <c:pt idx="54">
+                  <c:v>0</c:v>
+                </c:pt>
+                <c:pt idx="55">
+                  <c:v>0</c:v>
+                </c:pt>
+                <c:pt idx="56">
+                  <c:v>0</c:v>
+                </c:pt>
+                <c:pt idx="57">
+                  <c:v>0</c:v>
+                </c:pt>
+                <c:pt idx="58">
+                  <c:v>0</c:v>
+                </c:pt>
+                <c:pt idx="59">
+                  <c:v>0</c:v>
+                </c:pt>
+                <c:pt idx="60">
+                  <c:v>0</c:v>
+                </c:pt>
+                <c:pt idx="61">
+                  <c:v>1</c:v>
+                </c:pt>
+                <c:pt idx="62">
+                  <c:v>1</c:v>
+                </c:pt>
+                <c:pt idx="63">
+                  <c:v>1</c:v>
+                </c:pt>
+                <c:pt idx="64">
+                  <c:v>1</c:v>
+                </c:pt>
+                <c:pt idx="65">
+                  <c:v>1</c:v>
+                </c:pt>
+                <c:pt idx="66">
+                  <c:v>2</c:v>
+                </c:pt>
+                <c:pt idx="67">
+                  <c:v>1</c:v>
+                </c:pt>
+                <c:pt idx="68">
+                  <c:v>1</c:v>
+                </c:pt>
+                <c:pt idx="69">
+                  <c:v>1</c:v>
+                </c:pt>
+                <c:pt idx="70">
+                  <c:v>1</c:v>
+                </c:pt>
+                <c:pt idx="71">
+                  <c:v>2</c:v>
+                </c:pt>
+                <c:pt idx="72">
+                  <c:v>1</c:v>
+                </c:pt>
+                <c:pt idx="73">
+                  <c:v>1</c:v>
+                </c:pt>
+                <c:pt idx="74">
+                  <c:v>1</c:v>
+                </c:pt>
+                <c:pt idx="75">
+                  <c:v>1</c:v>
+                </c:pt>
+                <c:pt idx="76">
+                  <c:v>1</c:v>
+                </c:pt>
+                <c:pt idx="77">
+                  <c:v>1</c:v>
+                </c:pt>
+                <c:pt idx="78">
+                  <c:v>1</c:v>
+                </c:pt>
+                <c:pt idx="79">
+                  <c:v>0</c:v>
+                </c:pt>
+                <c:pt idx="80">
+                  <c:v>1</c:v>
+                </c:pt>
+                <c:pt idx="81">
+                  <c:v>1</c:v>
+                </c:pt>
+                <c:pt idx="82">
+                  <c:v>1</c:v>
+                </c:pt>
+                <c:pt idx="83">
+                  <c:v>1</c:v>
+                </c:pt>
+                <c:pt idx="84">
+                  <c:v>1</c:v>
+                </c:pt>
+                <c:pt idx="85">
+                  <c:v>0</c:v>
+                </c:pt>
+                <c:pt idx="86">
+                  <c:v>1</c:v>
+                </c:pt>
+                <c:pt idx="87">
+                  <c:v>1</c:v>
+                </c:pt>
+                <c:pt idx="88">
+                  <c:v>1</c:v>
+                </c:pt>
+                <c:pt idx="89">
+                  <c:v>1</c:v>
+                </c:pt>
+                <c:pt idx="90">
+                  <c:v>1</c:v>
+                </c:pt>
+                <c:pt idx="91">
+                  <c:v>1</c:v>
+                </c:pt>
+                <c:pt idx="92">
+                  <c:v>1</c:v>
+                </c:pt>
+                <c:pt idx="93">
+                  <c:v>1</c:v>
+                </c:pt>
+                <c:pt idx="94">
+                  <c:v>1</c:v>
+                </c:pt>
+                <c:pt idx="95">
+                  <c:v>1</c:v>
+                </c:pt>
+                <c:pt idx="96">
+                  <c:v>1</c:v>
+                </c:pt>
+                <c:pt idx="97">
+                  <c:v>1</c:v>
+                </c:pt>
+                <c:pt idx="98">
+                  <c:v>1</c:v>
+                </c:pt>
+                <c:pt idx="99">
+                  <c:v>1</c:v>
+                </c:pt>
+                <c:pt idx="100">
+                  <c:v>1</c:v>
+                </c:pt>
+                <c:pt idx="101">
+                  <c:v>1</c:v>
+                </c:pt>
+                <c:pt idx="102">
+                  <c:v>1</c:v>
+                </c:pt>
+                <c:pt idx="103">
+                  <c:v>2</c:v>
+                </c:pt>
+                <c:pt idx="104">
+                  <c:v>1</c:v>
+                </c:pt>
+                <c:pt idx="105">
+                  <c:v>1</c:v>
+                </c:pt>
+                <c:pt idx="106">
+                  <c:v>1</c:v>
+                </c:pt>
+                <c:pt idx="107">
+                  <c:v>2</c:v>
+                </c:pt>
+                <c:pt idx="108">
+                  <c:v>1</c:v>
+                </c:pt>
+                <c:pt idx="109">
+                  <c:v>1</c:v>
+                </c:pt>
+                <c:pt idx="110">
+                  <c:v>1</c:v>
+                </c:pt>
+                <c:pt idx="111">
+                  <c:v>1</c:v>
+                </c:pt>
+                <c:pt idx="112">
+                  <c:v>1</c:v>
+                </c:pt>
+                <c:pt idx="113">
+                  <c:v>1</c:v>
+                </c:pt>
+                <c:pt idx="114">
+                  <c:v>1</c:v>
+                </c:pt>
+                <c:pt idx="115">
+                  <c:v>1</c:v>
+                </c:pt>
+                <c:pt idx="116">
+                  <c:v>1</c:v>
+                </c:pt>
+                <c:pt idx="117">
+                  <c:v>1</c:v>
+                </c:pt>
+                <c:pt idx="118">
+                  <c:v>0</c:v>
+                </c:pt>
+                <c:pt idx="119">
+                  <c:v>0</c:v>
+                </c:pt>
+                <c:pt idx="120">
+                  <c:v>0</c:v>
+                </c:pt>
+                <c:pt idx="121">
+                  <c:v>1</c:v>
+                </c:pt>
+                <c:pt idx="122">
+                  <c:v>0</c:v>
+                </c:pt>
+                <c:pt idx="123">
+                  <c:v>0</c:v>
+                </c:pt>
+                <c:pt idx="124">
+                  <c:v>0</c:v>
+                </c:pt>
+              </c:numCache>
+            </c:numRef>
+          </c:val>
+          <c:smooth val="0"/>
+        </c:ser>
+        <c:marker val="1"/>
+        <c:smooth val="0"/>
+        <c:axId val="2118791784"/>
+        <c:axId val="2140495176"/>
+      </c:lineChart>
+      <c:catAx>
+        <c:axId val="2118791784"/>
+        <c:scaling>
+          <c:orientation val="minMax"/>
+        </c:scaling>
+        <c:delete val="0"/>
+        <c:axPos val="b"/>
+        <c:majorGridlines/>
+        <c:majorTickMark val="out"/>
+        <c:minorTickMark val="none"/>
+        <c:tickLblPos val="nextTo"/>
+        <c:txPr>
+          <a:bodyPr/>
+          <a:lstStyle/>
+          <a:p>
+            <a:pPr>
+              <a:defRPr sz="1000"/>
+            </a:pPr>
+          </a:p>
+        </c:txPr>
+        <c:crossAx val="2140495176"/>
+        <c:crosses val="autoZero"/>
+        <c:auto val="1"/>
+        <c:lblAlgn val="ctr"/>
+        <c:lblOffset val="100"/>
+        <c:noMultiLvlLbl val="0"/>
+      </c:catAx>
+      <c:valAx>
+        <c:axId val="2140495176"/>
+        <c:scaling/>
+        <c:delete val="0"/>
+        <c:axPos val="l"/>
+        <c:majorGridlines/>
+        <c:majorTickMark val="out"/>
+        <c:minorTickMark val="none"/>
+        <c:tickLblPos val="nextTo"/>
+        <c:txPr>
+          <a:bodyPr/>
+          <a:lstStyle/>
+          <a:p>
+            <a:pPr>
+              <a:defRPr sz="1000"/>
+            </a:pPr>
+          </a:p>
+        </c:txPr>
+        <c:crossAx val="2118791784"/>
+        <c:crosses val="autoZero"/>
+      </c:valAx>
+    </c:plotArea>
+    <c:legend>
+      <c:legendPos val="b"/>
+      <c:layout/>
+      <c:overlay val="0"/>
+    </c:legend>
+    <c:plotVisOnly val="1"/>
+    <c:dispBlanksAs val="gap"/>
+    <c:showDLblsOverMax val="0"/>
+  </c:chart>
+  <c:txPr>
+    <a:bodyPr/>
+    <a:lstStyle/>
+    <a:p>
+      <a:pPr>
+        <a:defRPr sz="1800"/>
+      </a:pPr>
+      <a:endParaRPr lang="en-US"/>
+    </a:p>
+  </c:txPr>
+  <c:externalData r:id="rId1">
+    <c:autoUpdate val="0"/>
+  </c:externalData>
+</c:chartSpace>
+</file>
+
+<file path=ppt/charts/chart2.xml><?xml version="1.0" encoding="utf-8"?>
+<c:chartSpace xmlns:c="http://schemas.openxmlformats.org/drawingml/2006/chart" xmlns:a="http://schemas.openxmlformats.org/drawingml/2006/main" xmlns:r="http://schemas.openxmlformats.org/officeDocument/2006/relationships">
+  <c:date1904 val="0"/>
+  <c:roundedCorners val="0"/>
+  <c:chart>
+    <c:autoTitleDeleted val="0"/>
+    <c:plotArea>
+      <c:layout/>
+      <c:doughnutChart>
+        <c:varyColors val="1"/>
+        <c:ser>
+          <c:idx val="0"/>
+          <c:order val="0"/>
+          <c:tx>
+            <c:strRef>
+              <c:f>Sheet1!$B$1</c:f>
+              <c:strCache>
+                <c:ptCount val="1"/>
+                <c:pt idx="0">
+                  <c:v>Sentiment Distribution</c:v>
+                </c:pt>
+              </c:strCache>
+            </c:strRef>
+          </c:tx>
+          <c:spPr>
+            <a:ln w="31750"/>
+          </c:spPr>
+          <c:cat>
+            <c:strRef>
+              <c:f>Sheet1!$A$2:$A$4</c:f>
+              <c:strCache>
+                <c:ptCount val="3"/>
+                <c:pt idx="0">
+                  <c:v>Positive</c:v>
+                </c:pt>
+                <c:pt idx="1">
+                  <c:v>Neutral</c:v>
+                </c:pt>
+                <c:pt idx="2">
+                  <c:v>Negative</c:v>
+                </c:pt>
+              </c:strCache>
+            </c:strRef>
+          </c:cat>
+          <c:val>
+            <c:numRef>
+              <c:f>Sheet1!$B$2:$B$4</c:f>
+              <c:numCache>
+                <c:formatCode>General</c:formatCode>
+                <c:ptCount val="3"/>
+                <c:pt idx="0">
+                  <c:v>2224</c:v>
+                </c:pt>
+                <c:pt idx="1">
+                  <c:v>2199</c:v>
+                </c:pt>
+                <c:pt idx="2">
+                  <c:v>470</c:v>
+                </c:pt>
+              </c:numCache>
+            </c:numRef>
+          </c:val>
+        </c:ser>
+        <c:dLbls>
+          <c:showLegendKey val="0"/>
+          <c:showVal val="0"/>
+          <c:showCatName val="0"/>
+          <c:showSerName val="0"/>
+          <c:showPercent val="0"/>
+          <c:showBubbleSize val="0"/>
+          <c:showLeaderLines val="1"/>
+        </c:dLbls>
+        <c:firstSliceAng val="0"/>
+        <c:holeSize val="50"/>
+      </c:doughnutChart>
+    </c:plotArea>
+    <c:legend>
+      <c:legendPos val="b"/>
+      <c:layout/>
+      <c:overlay val="0"/>
+    </c:legend>
+    <c:plotVisOnly val="1"/>
+    <c:dispBlanksAs val="gap"/>
+    <c:showDLblsOverMax val="0"/>
+  </c:chart>
+  <c:txPr>
+    <a:bodyPr/>
+    <a:lstStyle/>
+    <a:p>
+      <a:pPr>
+        <a:defRPr sz="1800"/>
+      </a:pPr>
+      <a:endParaRPr/>
+    </a:p>
+  </c:txPr>
+  <c:externalData r:id="rId1">
+    <c:autoUpdate val="0"/>
+  </c:externalData>
+</c:chartSpace>
+</file>
+
+<file path=ppt/charts/chart3.xml><?xml version="1.0" encoding="utf-8"?>
+<c:chartSpace xmlns:c="http://schemas.openxmlformats.org/drawingml/2006/chart" xmlns:a="http://schemas.openxmlformats.org/drawingml/2006/main" xmlns:r="http://schemas.openxmlformats.org/officeDocument/2006/relationships">
+  <c:date1904 val="0"/>
+  <c:chart>
+    <c:autoTitleDeleted val="0"/>
+    <c:plotArea>
       <c:barChart>
-        <c:barDir val="col"/>
+        <c:barDir val="bar"/>
         <c:grouping val="clustered"/>
         <c:ser>
           <c:idx val="0"/>
@@ -125,42 +2683,475 @@
               <c:strCache>
                 <c:ptCount val="1"/>
                 <c:pt idx="0">
-                  <c:v>Values</c:v>
+                  <c:v>Positive</c:v>
                 </c:pt>
               </c:strCache>
             </c:strRef>
           </c:tx>
+          <c:spPr>
+            <a:ln w="31750"/>
+          </c:spPr>
           <c:cat>
             <c:strRef>
-              <c:f>Sheet1!$A$2:$A$4</c:f>
+              <c:f>Sheet1!$A$2:$A$22</c:f>
               <c:strCache>
-                <c:ptCount val="3"/>
+                <c:ptCount val="21"/>
                 <c:pt idx="0">
-                  <c:v>A</c:v>
+                  <c:v>ABB Bank</c:v>
                 </c:pt>
                 <c:pt idx="1">
-                  <c:v>B</c:v>
+                  <c:v>AFB Bank</c:v>
                 </c:pt>
                 <c:pt idx="2">
-                  <c:v>C</c:v>
+                  <c:v>AccessBank</c:v>
+                </c:pt>
+                <c:pt idx="3">
+                  <c:v>Azər Türk Bank</c:v>
+                </c:pt>
+                <c:pt idx="4">
+                  <c:v>Azərbaycan Sənaye Bankı</c:v>
+                </c:pt>
+                <c:pt idx="5">
+                  <c:v>BTB Bank</c:v>
+                </c:pt>
+                <c:pt idx="6">
+                  <c:v>Bank Avrasiya</c:v>
+                </c:pt>
+                <c:pt idx="7">
+                  <c:v>Bank Of Baku</c:v>
+                </c:pt>
+                <c:pt idx="8">
+                  <c:v>Bank Respublika</c:v>
+                </c:pt>
+                <c:pt idx="9">
+                  <c:v>Express Bank</c:v>
+                </c:pt>
+                <c:pt idx="10">
+                  <c:v>Kapital Bank</c:v>
+                </c:pt>
+                <c:pt idx="11">
+                  <c:v>Leobank</c:v>
+                </c:pt>
+                <c:pt idx="12">
+                  <c:v>Paşa Bank</c:v>
+                </c:pt>
+                <c:pt idx="13">
+                  <c:v>Rabita Bank</c:v>
+                </c:pt>
+                <c:pt idx="14">
+                  <c:v>Turan Bank</c:v>
+                </c:pt>
+                <c:pt idx="15">
+                  <c:v>Unibank</c:v>
+                </c:pt>
+                <c:pt idx="16">
+                  <c:v>VTB Bank</c:v>
+                </c:pt>
+                <c:pt idx="17">
+                  <c:v>Xalq Bank</c:v>
+                </c:pt>
+                <c:pt idx="18">
+                  <c:v>Yapı Kredi Bank</c:v>
+                </c:pt>
+                <c:pt idx="19">
+                  <c:v>Yelo Bank</c:v>
+                </c:pt>
+                <c:pt idx="20">
+                  <c:v>Ziraat Bank</c:v>
                 </c:pt>
               </c:strCache>
             </c:strRef>
           </c:cat>
           <c:val>
             <c:numRef>
-              <c:f>Sheet1!$B$2:$B$4</c:f>
+              <c:f>Sheet1!$B$2:$B$22</c:f>
               <c:numCache>
                 <c:formatCode>General</c:formatCode>
-                <c:ptCount val="3"/>
+                <c:ptCount val="21"/>
                 <c:pt idx="0">
+                  <c:v>275</c:v>
+                </c:pt>
+                <c:pt idx="1">
+                  <c:v>4</c:v>
+                </c:pt>
+                <c:pt idx="2">
+                  <c:v>107</c:v>
+                </c:pt>
+                <c:pt idx="3">
+                  <c:v>55</c:v>
+                </c:pt>
+                <c:pt idx="4">
+                  <c:v>23</c:v>
+                </c:pt>
+                <c:pt idx="5">
+                  <c:v>40</c:v>
+                </c:pt>
+                <c:pt idx="6">
+                  <c:v>22</c:v>
+                </c:pt>
+                <c:pt idx="7">
+                  <c:v>62</c:v>
+                </c:pt>
+                <c:pt idx="8">
+                  <c:v>83</c:v>
+                </c:pt>
+                <c:pt idx="9">
+                  <c:v>132</c:v>
+                </c:pt>
+                <c:pt idx="10">
+                  <c:v>635</c:v>
+                </c:pt>
+                <c:pt idx="11">
+                  <c:v>0</c:v>
+                </c:pt>
+                <c:pt idx="12">
+                  <c:v>90</c:v>
+                </c:pt>
+                <c:pt idx="13">
+                  <c:v>44</c:v>
+                </c:pt>
+                <c:pt idx="14">
+                  <c:v>119</c:v>
+                </c:pt>
+                <c:pt idx="15">
+                  <c:v>116</c:v>
+                </c:pt>
+                <c:pt idx="16">
+                  <c:v>53</c:v>
+                </c:pt>
+                <c:pt idx="17">
+                  <c:v>58</c:v>
+                </c:pt>
+                <c:pt idx="18">
+                  <c:v>7</c:v>
+                </c:pt>
+                <c:pt idx="19">
+                  <c:v>224</c:v>
+                </c:pt>
+                <c:pt idx="20">
+                  <c:v>75</c:v>
+                </c:pt>
+              </c:numCache>
+            </c:numRef>
+          </c:val>
+        </c:ser>
+        <c:ser>
+          <c:idx val="1"/>
+          <c:order val="1"/>
+          <c:tx>
+            <c:strRef>
+              <c:f>Sheet1!$C$1</c:f>
+              <c:strCache>
+                <c:ptCount val="1"/>
+                <c:pt idx="0">
+                  <c:v>Neutral</c:v>
+                </c:pt>
+              </c:strCache>
+            </c:strRef>
+          </c:tx>
+          <c:spPr>
+            <a:ln w="31750"/>
+          </c:spPr>
+          <c:cat>
+            <c:strRef>
+              <c:f>Sheet1!$A$2:$A$22</c:f>
+              <c:strCache>
+                <c:ptCount val="21"/>
+                <c:pt idx="0">
+                  <c:v>ABB Bank</c:v>
+                </c:pt>
+                <c:pt idx="1">
+                  <c:v>AFB Bank</c:v>
+                </c:pt>
+                <c:pt idx="2">
+                  <c:v>AccessBank</c:v>
+                </c:pt>
+                <c:pt idx="3">
+                  <c:v>Azər Türk Bank</c:v>
+                </c:pt>
+                <c:pt idx="4">
+                  <c:v>Azərbaycan Sənaye Bankı</c:v>
+                </c:pt>
+                <c:pt idx="5">
+                  <c:v>BTB Bank</c:v>
+                </c:pt>
+                <c:pt idx="6">
+                  <c:v>Bank Avrasiya</c:v>
+                </c:pt>
+                <c:pt idx="7">
+                  <c:v>Bank Of Baku</c:v>
+                </c:pt>
+                <c:pt idx="8">
+                  <c:v>Bank Respublika</c:v>
+                </c:pt>
+                <c:pt idx="9">
+                  <c:v>Express Bank</c:v>
+                </c:pt>
+                <c:pt idx="10">
+                  <c:v>Kapital Bank</c:v>
+                </c:pt>
+                <c:pt idx="11">
+                  <c:v>Leobank</c:v>
+                </c:pt>
+                <c:pt idx="12">
+                  <c:v>Paşa Bank</c:v>
+                </c:pt>
+                <c:pt idx="13">
+                  <c:v>Rabita Bank</c:v>
+                </c:pt>
+                <c:pt idx="14">
+                  <c:v>Turan Bank</c:v>
+                </c:pt>
+                <c:pt idx="15">
+                  <c:v>Unibank</c:v>
+                </c:pt>
+                <c:pt idx="16">
+                  <c:v>VTB Bank</c:v>
+                </c:pt>
+                <c:pt idx="17">
+                  <c:v>Xalq Bank</c:v>
+                </c:pt>
+                <c:pt idx="18">
+                  <c:v>Yapı Kredi Bank</c:v>
+                </c:pt>
+                <c:pt idx="19">
+                  <c:v>Yelo Bank</c:v>
+                </c:pt>
+                <c:pt idx="20">
+                  <c:v>Ziraat Bank</c:v>
+                </c:pt>
+              </c:strCache>
+            </c:strRef>
+          </c:cat>
+          <c:val>
+            <c:numRef>
+              <c:f>Sheet1!$C$2:$C$22</c:f>
+              <c:numCache>
+                <c:formatCode>General</c:formatCode>
+                <c:ptCount val="21"/>
+                <c:pt idx="0">
+                  <c:v>263</c:v>
+                </c:pt>
+                <c:pt idx="1">
+                  <c:v>18</c:v>
+                </c:pt>
+                <c:pt idx="2">
+                  <c:v>173</c:v>
+                </c:pt>
+                <c:pt idx="3">
+                  <c:v>34</c:v>
+                </c:pt>
+                <c:pt idx="4">
+                  <c:v>18</c:v>
+                </c:pt>
+                <c:pt idx="5">
+                  <c:v>21</c:v>
+                </c:pt>
+                <c:pt idx="6">
+                  <c:v>21</c:v>
+                </c:pt>
+                <c:pt idx="7">
+                  <c:v>75</c:v>
+                </c:pt>
+                <c:pt idx="8">
+                  <c:v>180</c:v>
+                </c:pt>
+                <c:pt idx="9">
+                  <c:v>40</c:v>
+                </c:pt>
+                <c:pt idx="10">
+                  <c:v>358</c:v>
+                </c:pt>
+                <c:pt idx="11">
+                  <c:v>56</c:v>
+                </c:pt>
+                <c:pt idx="12">
+                  <c:v>189</c:v>
+                </c:pt>
+                <c:pt idx="13">
+                  <c:v>54</c:v>
+                </c:pt>
+                <c:pt idx="14">
+                  <c:v>50</c:v>
+                </c:pt>
+                <c:pt idx="15">
+                  <c:v>160</c:v>
+                </c:pt>
+                <c:pt idx="16">
+                  <c:v>26</c:v>
+                </c:pt>
+                <c:pt idx="17">
+                  <c:v>44</c:v>
+                </c:pt>
+                <c:pt idx="18">
+                  <c:v>3</c:v>
+                </c:pt>
+                <c:pt idx="19">
+                  <c:v>283</c:v>
+                </c:pt>
+                <c:pt idx="20">
+                  <c:v>133</c:v>
+                </c:pt>
+              </c:numCache>
+            </c:numRef>
+          </c:val>
+        </c:ser>
+        <c:ser>
+          <c:idx val="2"/>
+          <c:order val="2"/>
+          <c:tx>
+            <c:strRef>
+              <c:f>Sheet1!$D$1</c:f>
+              <c:strCache>
+                <c:ptCount val="1"/>
+                <c:pt idx="0">
+                  <c:v>Negative</c:v>
+                </c:pt>
+              </c:strCache>
+            </c:strRef>
+          </c:tx>
+          <c:spPr>
+            <a:ln w="31750"/>
+          </c:spPr>
+          <c:cat>
+            <c:strRef>
+              <c:f>Sheet1!$A$2:$A$22</c:f>
+              <c:strCache>
+                <c:ptCount val="21"/>
+                <c:pt idx="0">
+                  <c:v>ABB Bank</c:v>
+                </c:pt>
+                <c:pt idx="1">
+                  <c:v>AFB Bank</c:v>
+                </c:pt>
+                <c:pt idx="2">
+                  <c:v>AccessBank</c:v>
+                </c:pt>
+                <c:pt idx="3">
+                  <c:v>Azər Türk Bank</c:v>
+                </c:pt>
+                <c:pt idx="4">
+                  <c:v>Azərbaycan Sənaye Bankı</c:v>
+                </c:pt>
+                <c:pt idx="5">
+                  <c:v>BTB Bank</c:v>
+                </c:pt>
+                <c:pt idx="6">
+                  <c:v>Bank Avrasiya</c:v>
+                </c:pt>
+                <c:pt idx="7">
+                  <c:v>Bank Of Baku</c:v>
+                </c:pt>
+                <c:pt idx="8">
+                  <c:v>Bank Respublika</c:v>
+                </c:pt>
+                <c:pt idx="9">
+                  <c:v>Express Bank</c:v>
+                </c:pt>
+                <c:pt idx="10">
+                  <c:v>Kapital Bank</c:v>
+                </c:pt>
+                <c:pt idx="11">
+                  <c:v>Leobank</c:v>
+                </c:pt>
+                <c:pt idx="12">
+                  <c:v>Paşa Bank</c:v>
+                </c:pt>
+                <c:pt idx="13">
+                  <c:v>Rabita Bank</c:v>
+                </c:pt>
+                <c:pt idx="14">
+                  <c:v>Turan Bank</c:v>
+                </c:pt>
+                <c:pt idx="15">
+                  <c:v>Unibank</c:v>
+                </c:pt>
+                <c:pt idx="16">
+                  <c:v>VTB Bank</c:v>
+                </c:pt>
+                <c:pt idx="17">
+                  <c:v>Xalq Bank</c:v>
+                </c:pt>
+                <c:pt idx="18">
+                  <c:v>Yapı Kredi Bank</c:v>
+                </c:pt>
+                <c:pt idx="19">
+                  <c:v>Yelo Bank</c:v>
+                </c:pt>
+                <c:pt idx="20">
+                  <c:v>Ziraat Bank</c:v>
+                </c:pt>
+              </c:strCache>
+            </c:strRef>
+          </c:cat>
+          <c:val>
+            <c:numRef>
+              <c:f>Sheet1!$D$2:$D$22</c:f>
+              <c:numCache>
+                <c:formatCode>General</c:formatCode>
+                <c:ptCount val="21"/>
+                <c:pt idx="0">
+                  <c:v>33</c:v>
+                </c:pt>
+                <c:pt idx="1">
+                  <c:v>2</c:v>
+                </c:pt>
+                <c:pt idx="2">
+                  <c:v>12</c:v>
+                </c:pt>
+                <c:pt idx="3">
                   <c:v>10</c:v>
                 </c:pt>
-                <c:pt idx="1">
-                  <c:v>30</c:v>
-                </c:pt>
-                <c:pt idx="2">
-                  <c:v>20</c:v>
+                <c:pt idx="4">
+                  <c:v>12</c:v>
+                </c:pt>
+                <c:pt idx="5">
+                  <c:v>72</c:v>
+                </c:pt>
+                <c:pt idx="6">
+                  <c:v>52</c:v>
+                </c:pt>
+                <c:pt idx="7">
+                  <c:v>9</c:v>
+                </c:pt>
+                <c:pt idx="8">
+                  <c:v>9</c:v>
+                </c:pt>
+                <c:pt idx="9">
+                  <c:v>7</c:v>
+                </c:pt>
+                <c:pt idx="10">
+                  <c:v>71</c:v>
+                </c:pt>
+                <c:pt idx="11">
+                  <c:v>2</c:v>
+                </c:pt>
+                <c:pt idx="12">
+                  <c:v>36</c:v>
+                </c:pt>
+                <c:pt idx="13">
+                  <c:v>17</c:v>
+                </c:pt>
+                <c:pt idx="14">
+                  <c:v>28</c:v>
+                </c:pt>
+                <c:pt idx="15">
+                  <c:v>34</c:v>
+                </c:pt>
+                <c:pt idx="16">
+                  <c:v>6</c:v>
+                </c:pt>
+                <c:pt idx="17">
+                  <c:v>5</c:v>
+                </c:pt>
+                <c:pt idx="18">
+                  <c:v>13</c:v>
+                </c:pt>
+                <c:pt idx="19">
+                  <c:v>26</c:v>
+                </c:pt>
+                <c:pt idx="20">
+                  <c:v>14</c:v>
                 </c:pt>
               </c:numCache>
             </c:numRef>
@@ -175,10 +3166,20 @@
           <c:orientation val="minMax"/>
         </c:scaling>
         <c:delete val="0"/>
-        <c:axPos val="b"/>
+        <c:axPos val="l"/>
+        <c:majorGridlines/>
         <c:majorTickMark val="out"/>
         <c:minorTickMark val="none"/>
         <c:tickLblPos val="nextTo"/>
+        <c:txPr>
+          <a:bodyPr/>
+          <a:lstStyle/>
+          <a:p>
+            <a:pPr>
+              <a:defRPr sz="1000"/>
+            </a:pPr>
+          </a:p>
+        </c:txPr>
         <c:crossAx val="-2113994440"/>
         <c:crosses val="autoZero"/>
         <c:auto val="1"/>
@@ -190,15 +3191,27 @@
         <c:axId val="-2113994440"/>
         <c:scaling/>
         <c:delete val="0"/>
-        <c:axPos val="l"/>
+        <c:axPos val="b"/>
         <c:majorGridlines/>
         <c:majorTickMark val="out"/>
         <c:minorTickMark val="none"/>
         <c:tickLblPos val="nextTo"/>
+        <c:txPr>
+          <a:bodyPr/>
+          <a:lstStyle/>
+          <a:p>
+            <a:pPr>
+              <a:defRPr sz="1000"/>
+            </a:pPr>
+          </a:p>
+        </c:txPr>
         <c:crossAx val="-2068027336"/>
         <c:crosses val="autoZero"/>
       </c:valAx>
     </c:plotArea>
+    <c:legend>
+      <c:legendPos val="b"/>
+    </c:legend>
     <c:dispBlanksAs val="gap"/>
   </c:chart>
   <c:txPr>
@@ -3205,6 +6218,66 @@
             <a:spLocks noGrp="1"/>
           </p:cNvSpPr>
           <p:nvPr>
+            <p:ph type="ctrTitle"/>
+          </p:nvPr>
+        </p:nvSpPr>
+        <p:spPr/>
+        <p:txBody>
+          <a:bodyPr/>
+          <a:lstStyle/>
+          <a:p>
+            <a:r>
+              <a:t>Report for BTB Bank</a:t>
+            </a:r>
+          </a:p>
+        </p:txBody>
+      </p:sp>
+      <p:sp>
+        <p:nvSpPr>
+          <p:cNvPr id="3" name="Subtitle 2"/>
+          <p:cNvSpPr>
+            <a:spLocks noGrp="1"/>
+          </p:cNvSpPr>
+          <p:nvPr>
+            <p:ph type="subTitle" idx="1"/>
+          </p:nvPr>
+        </p:nvSpPr>
+        <p:spPr/>
+        <p:txBody>
+          <a:bodyPr/>
+          <a:lstStyle/>
+          <a:p>
+            <a:r>
+              <a:t>Date: 2025-05-30</a:t>
+            </a:r>
+          </a:p>
+        </p:txBody>
+      </p:sp>
+    </p:spTree>
+  </p:cSld>
+  <p:clrMapOvr>
+    <a:masterClrMapping/>
+  </p:clrMapOvr>
+</p:sld>
+</file>
+
+<file path=ppt/slides/slide2.xml><?xml version="1.0" encoding="utf-8"?>
+<p:sld xmlns:a="http://schemas.openxmlformats.org/drawingml/2006/main" xmlns:p="http://schemas.openxmlformats.org/presentationml/2006/main" xmlns:r="http://schemas.openxmlformats.org/officeDocument/2006/relationships">
+  <p:cSld>
+    <p:spTree>
+      <p:nvGrpSpPr>
+        <p:cNvPr id="1" name=""/>
+        <p:cNvGrpSpPr/>
+        <p:nvPr/>
+      </p:nvGrpSpPr>
+      <p:grpSpPr/>
+      <p:sp>
+        <p:nvSpPr>
+          <p:cNvPr id="2" name="Title 1"/>
+          <p:cNvSpPr>
+            <a:spLocks noGrp="1"/>
+          </p:cNvSpPr>
+          <p:nvPr>
             <p:ph type="title"/>
           </p:nvPr>
         </p:nvSpPr>
@@ -3215,73 +6288,92 @@
           <a:p/>
         </p:txBody>
       </p:sp>
-      <p:pic>
-        <p:nvPicPr>
-          <p:cNvPr id="3" name="Picture 2" descr="WhatsApp Image 2025-04-17 at 5.00.14 PM.jpeg"/>
-          <p:cNvPicPr>
-            <a:picLocks noChangeAspect="1"/>
-          </p:cNvPicPr>
-          <p:nvPr/>
-        </p:nvPicPr>
-        <p:blipFill>
-          <a:blip r:embed="rId2"/>
-          <a:stretch>
-            <a:fillRect/>
-          </a:stretch>
-        </p:blipFill>
-        <p:spPr>
-          <a:xfrm>
-            <a:off x="457200" y="457200"/>
-            <a:ext cx="1371600" cy="1828800"/>
-          </a:xfrm>
-          <a:prstGeom prst="rect">
-            <a:avLst/>
-          </a:prstGeom>
-        </p:spPr>
-      </p:pic>
-      <p:sp>
-        <p:nvSpPr>
-          <p:cNvPr id="4" name="TextBox 3"/>
-          <p:cNvSpPr txBox="1"/>
-          <p:nvPr/>
-        </p:nvSpPr>
-        <p:spPr>
-          <a:xfrm>
-            <a:off x="2743200" y="457200"/>
-            <a:ext cx="4572000" cy="914400"/>
-          </a:xfrm>
-          <a:prstGeom prst="rect">
-            <a:avLst/>
-          </a:prstGeom>
-          <a:noFill/>
-        </p:spPr>
-        <p:txBody>
-          <a:bodyPr wrap="none">
-            <a:spAutoFit/>
-          </a:bodyPr>
-          <a:lstStyle/>
-          <a:p>
-            <a:r>
-              <a:t>yoyo</a:t>
-            </a:r>
-          </a:p>
-        </p:txBody>
-      </p:sp>
       <p:graphicFrame>
         <p:nvGraphicFramePr>
-          <p:cNvPr id="5" name="Chart 4"/>
+          <p:cNvPr id="3" name="Chart 2"/>
           <p:cNvGraphicFramePr>
             <a:graphicFrameLocks noGrp="1"/>
           </p:cNvGraphicFramePr>
           <p:nvPr/>
         </p:nvGraphicFramePr>
         <p:xfrm>
-          <a:off x="914400" y="2743200"/>
-          <a:ext cx="5486400" cy="2743200"/>
+          <a:off x="457200" y="914400"/>
+          <a:ext cx="4114800" cy="3657600"/>
+        </p:xfrm>
+        <a:graphic>
+          <a:graphicData uri="http://schemas.openxmlformats.org/drawingml/2006/chart">
+            <c:chart xmlns:c="http://schemas.openxmlformats.org/drawingml/2006/chart" r:id="rId2"/>
+          </a:graphicData>
+        </a:graphic>
+      </p:graphicFrame>
+      <p:graphicFrame>
+        <p:nvGraphicFramePr>
+          <p:cNvPr id="4" name="Chart 3"/>
+          <p:cNvGraphicFramePr>
+            <a:graphicFrameLocks noGrp="1"/>
+          </p:cNvGraphicFramePr>
+          <p:nvPr/>
+        </p:nvGraphicFramePr>
+        <p:xfrm>
+          <a:off x="5029200" y="914400"/>
+          <a:ext cx="4114800" cy="3657600"/>
         </p:xfrm>
         <a:graphic>
           <a:graphicData uri="http://schemas.openxmlformats.org/drawingml/2006/chart">
             <c:chart xmlns:c="http://schemas.openxmlformats.org/drawingml/2006/chart" r:id="rId3"/>
+          </a:graphicData>
+        </a:graphic>
+      </p:graphicFrame>
+    </p:spTree>
+  </p:cSld>
+  <p:clrMapOvr>
+    <a:masterClrMapping/>
+  </p:clrMapOvr>
+</p:sld>
+</file>
+
+<file path=ppt/slides/slide3.xml><?xml version="1.0" encoding="utf-8"?>
+<p:sld xmlns:a="http://schemas.openxmlformats.org/drawingml/2006/main" xmlns:p="http://schemas.openxmlformats.org/presentationml/2006/main" xmlns:r="http://schemas.openxmlformats.org/officeDocument/2006/relationships">
+  <p:cSld>
+    <p:spTree>
+      <p:nvGrpSpPr>
+        <p:cNvPr id="1" name=""/>
+        <p:cNvGrpSpPr/>
+        <p:nvPr/>
+      </p:nvGrpSpPr>
+      <p:grpSpPr/>
+      <p:sp>
+        <p:nvSpPr>
+          <p:cNvPr id="2" name="Title 1"/>
+          <p:cNvSpPr>
+            <a:spLocks noGrp="1"/>
+          </p:cNvSpPr>
+          <p:nvPr>
+            <p:ph type="title"/>
+          </p:nvPr>
+        </p:nvSpPr>
+        <p:spPr/>
+        <p:txBody>
+          <a:bodyPr/>
+          <a:lstStyle/>
+          <a:p/>
+        </p:txBody>
+      </p:sp>
+      <p:graphicFrame>
+        <p:nvGraphicFramePr>
+          <p:cNvPr id="3" name="Chart 2"/>
+          <p:cNvGraphicFramePr>
+            <a:graphicFrameLocks noGrp="1"/>
+          </p:cNvGraphicFramePr>
+          <p:nvPr/>
+        </p:nvGraphicFramePr>
+        <p:xfrm>
+          <a:off x="457200" y="914400"/>
+          <a:ext cx="8229600" cy="4572000"/>
+        </p:xfrm>
+        <a:graphic>
+          <a:graphicData uri="http://schemas.openxmlformats.org/drawingml/2006/chart">
+            <c:chart xmlns:c="http://schemas.openxmlformats.org/drawingml/2006/chart" r:id="rId2"/>
           </a:graphicData>
         </a:graphic>
       </p:graphicFrame>

</xml_diff>